<commit_message>
Examples (ttc-2015-fuml-activity-diagrams, documentation): Minor poster correction.
</commit_message>
<xml_diff>
--- a/examples/ttc-2015-fuml-activity-diagrams/documentation/figures/solution-poster-a0.pptx
+++ b/examples/ttc-2015-fuml-activity-diagrams/documentation/figures/solution-poster-a0.pptx
@@ -192,7 +192,7 @@
           <a:p>
             <a:fld id="{8249DFA1-11E0-AC4F-B82E-E4156D0C46C6}" type="datetimeFigureOut">
               <a:rPr lang="en-US" smtClean="0"/>
-              <a:t>15/09/15</a:t>
+              <a:t>17/09/15</a:t>
             </a:fld>
             <a:endParaRPr lang="en-GB"/>
           </a:p>
@@ -730,7 +730,7 @@
           <a:p>
             <a:fld id="{84979CAE-5A64-144B-B638-52047A26C15E}" type="datetimeFigureOut">
               <a:rPr lang="en-US" smtClean="0"/>
-              <a:t>15/09/15</a:t>
+              <a:t>17/09/15</a:t>
             </a:fld>
             <a:endParaRPr lang="en-GB"/>
           </a:p>
@@ -900,7 +900,7 @@
           <a:p>
             <a:fld id="{84979CAE-5A64-144B-B638-52047A26C15E}" type="datetimeFigureOut">
               <a:rPr lang="en-US" smtClean="0"/>
-              <a:t>15/09/15</a:t>
+              <a:t>17/09/15</a:t>
             </a:fld>
             <a:endParaRPr lang="en-GB"/>
           </a:p>
@@ -1080,7 +1080,7 @@
           <a:p>
             <a:fld id="{84979CAE-5A64-144B-B638-52047A26C15E}" type="datetimeFigureOut">
               <a:rPr lang="en-US" smtClean="0"/>
-              <a:t>15/09/15</a:t>
+              <a:t>17/09/15</a:t>
             </a:fld>
             <a:endParaRPr lang="en-GB"/>
           </a:p>
@@ -1250,7 +1250,7 @@
           <a:p>
             <a:fld id="{84979CAE-5A64-144B-B638-52047A26C15E}" type="datetimeFigureOut">
               <a:rPr lang="en-US" smtClean="0"/>
-              <a:t>15/09/15</a:t>
+              <a:t>17/09/15</a:t>
             </a:fld>
             <a:endParaRPr lang="en-GB"/>
           </a:p>
@@ -1496,7 +1496,7 @@
           <a:p>
             <a:fld id="{84979CAE-5A64-144B-B638-52047A26C15E}" type="datetimeFigureOut">
               <a:rPr lang="en-US" smtClean="0"/>
-              <a:t>15/09/15</a:t>
+              <a:t>17/09/15</a:t>
             </a:fld>
             <a:endParaRPr lang="en-GB"/>
           </a:p>
@@ -1784,7 +1784,7 @@
           <a:p>
             <a:fld id="{84979CAE-5A64-144B-B638-52047A26C15E}" type="datetimeFigureOut">
               <a:rPr lang="en-US" smtClean="0"/>
-              <a:t>15/09/15</a:t>
+              <a:t>17/09/15</a:t>
             </a:fld>
             <a:endParaRPr lang="en-GB"/>
           </a:p>
@@ -2211,7 +2211,7 @@
           <a:p>
             <a:fld id="{84979CAE-5A64-144B-B638-52047A26C15E}" type="datetimeFigureOut">
               <a:rPr lang="en-US" smtClean="0"/>
-              <a:t>15/09/15</a:t>
+              <a:t>17/09/15</a:t>
             </a:fld>
             <a:endParaRPr lang="en-GB"/>
           </a:p>
@@ -2329,7 +2329,7 @@
           <a:p>
             <a:fld id="{84979CAE-5A64-144B-B638-52047A26C15E}" type="datetimeFigureOut">
               <a:rPr lang="en-US" smtClean="0"/>
-              <a:t>15/09/15</a:t>
+              <a:t>17/09/15</a:t>
             </a:fld>
             <a:endParaRPr lang="en-GB"/>
           </a:p>
@@ -2424,7 +2424,7 @@
           <a:p>
             <a:fld id="{84979CAE-5A64-144B-B638-52047A26C15E}" type="datetimeFigureOut">
               <a:rPr lang="en-US" smtClean="0"/>
-              <a:t>15/09/15</a:t>
+              <a:t>17/09/15</a:t>
             </a:fld>
             <a:endParaRPr lang="en-GB"/>
           </a:p>
@@ -2701,7 +2701,7 @@
           <a:p>
             <a:fld id="{84979CAE-5A64-144B-B638-52047A26C15E}" type="datetimeFigureOut">
               <a:rPr lang="en-US" smtClean="0"/>
-              <a:t>15/09/15</a:t>
+              <a:t>17/09/15</a:t>
             </a:fld>
             <a:endParaRPr lang="en-GB"/>
           </a:p>
@@ -2954,7 +2954,7 @@
           <a:p>
             <a:fld id="{84979CAE-5A64-144B-B638-52047A26C15E}" type="datetimeFigureOut">
               <a:rPr lang="en-US" smtClean="0"/>
-              <a:t>15/09/15</a:t>
+              <a:t>17/09/15</a:t>
             </a:fld>
             <a:endParaRPr lang="en-GB"/>
           </a:p>
@@ -3167,7 +3167,7 @@
           <a:p>
             <a:fld id="{84979CAE-5A64-144B-B638-52047A26C15E}" type="datetimeFigureOut">
               <a:rPr lang="en-US" smtClean="0"/>
-              <a:t>15/09/15</a:t>
+              <a:t>17/09/15</a:t>
             </a:fld>
             <a:endParaRPr lang="en-GB"/>
           </a:p>
@@ -8647,7 +8647,7 @@
           <p:spPr bwMode="auto">
             <a:xfrm>
               <a:off x="14120865" y="36336188"/>
-              <a:ext cx="1602429" cy="1670074"/>
+              <a:ext cx="1602429" cy="1729328"/>
             </a:xfrm>
             <a:prstGeom prst="rect">
               <a:avLst/>
@@ -8791,7 +8791,7 @@
           <p:spPr bwMode="auto">
             <a:xfrm>
               <a:off x="11183079" y="37449570"/>
-              <a:ext cx="2937786" cy="556691"/>
+              <a:ext cx="2937786" cy="615947"/>
             </a:xfrm>
             <a:prstGeom prst="rect">
               <a:avLst/>

</xml_diff>

<commit_message>
Examples (ttc-2015-fuml-activity-diagrams, documentation): Fixed email address.
</commit_message>
<xml_diff>
--- a/examples/ttc-2015-fuml-activity-diagrams/documentation/figures/solution-poster-a0.pptx
+++ b/examples/ttc-2015-fuml-activity-diagrams/documentation/figures/solution-poster-a0.pptx
@@ -192,7 +192,7 @@
           <a:p>
             <a:fld id="{8249DFA1-11E0-AC4F-B82E-E4156D0C46C6}" type="datetimeFigureOut">
               <a:rPr lang="en-US" smtClean="0"/>
-              <a:t>17/09/15</a:t>
+              <a:t>29/10/15</a:t>
             </a:fld>
             <a:endParaRPr lang="en-GB"/>
           </a:p>
@@ -730,7 +730,7 @@
           <a:p>
             <a:fld id="{84979CAE-5A64-144B-B638-52047A26C15E}" type="datetimeFigureOut">
               <a:rPr lang="en-US" smtClean="0"/>
-              <a:t>17/09/15</a:t>
+              <a:t>29/10/15</a:t>
             </a:fld>
             <a:endParaRPr lang="en-GB"/>
           </a:p>
@@ -900,7 +900,7 @@
           <a:p>
             <a:fld id="{84979CAE-5A64-144B-B638-52047A26C15E}" type="datetimeFigureOut">
               <a:rPr lang="en-US" smtClean="0"/>
-              <a:t>17/09/15</a:t>
+              <a:t>29/10/15</a:t>
             </a:fld>
             <a:endParaRPr lang="en-GB"/>
           </a:p>
@@ -1080,7 +1080,7 @@
           <a:p>
             <a:fld id="{84979CAE-5A64-144B-B638-52047A26C15E}" type="datetimeFigureOut">
               <a:rPr lang="en-US" smtClean="0"/>
-              <a:t>17/09/15</a:t>
+              <a:t>29/10/15</a:t>
             </a:fld>
             <a:endParaRPr lang="en-GB"/>
           </a:p>
@@ -1250,7 +1250,7 @@
           <a:p>
             <a:fld id="{84979CAE-5A64-144B-B638-52047A26C15E}" type="datetimeFigureOut">
               <a:rPr lang="en-US" smtClean="0"/>
-              <a:t>17/09/15</a:t>
+              <a:t>29/10/15</a:t>
             </a:fld>
             <a:endParaRPr lang="en-GB"/>
           </a:p>
@@ -1496,7 +1496,7 @@
           <a:p>
             <a:fld id="{84979CAE-5A64-144B-B638-52047A26C15E}" type="datetimeFigureOut">
               <a:rPr lang="en-US" smtClean="0"/>
-              <a:t>17/09/15</a:t>
+              <a:t>29/10/15</a:t>
             </a:fld>
             <a:endParaRPr lang="en-GB"/>
           </a:p>
@@ -1784,7 +1784,7 @@
           <a:p>
             <a:fld id="{84979CAE-5A64-144B-B638-52047A26C15E}" type="datetimeFigureOut">
               <a:rPr lang="en-US" smtClean="0"/>
-              <a:t>17/09/15</a:t>
+              <a:t>29/10/15</a:t>
             </a:fld>
             <a:endParaRPr lang="en-GB"/>
           </a:p>
@@ -2211,7 +2211,7 @@
           <a:p>
             <a:fld id="{84979CAE-5A64-144B-B638-52047A26C15E}" type="datetimeFigureOut">
               <a:rPr lang="en-US" smtClean="0"/>
-              <a:t>17/09/15</a:t>
+              <a:t>29/10/15</a:t>
             </a:fld>
             <a:endParaRPr lang="en-GB"/>
           </a:p>
@@ -2329,7 +2329,7 @@
           <a:p>
             <a:fld id="{84979CAE-5A64-144B-B638-52047A26C15E}" type="datetimeFigureOut">
               <a:rPr lang="en-US" smtClean="0"/>
-              <a:t>17/09/15</a:t>
+              <a:t>29/10/15</a:t>
             </a:fld>
             <a:endParaRPr lang="en-GB"/>
           </a:p>
@@ -2424,7 +2424,7 @@
           <a:p>
             <a:fld id="{84979CAE-5A64-144B-B638-52047A26C15E}" type="datetimeFigureOut">
               <a:rPr lang="en-US" smtClean="0"/>
-              <a:t>17/09/15</a:t>
+              <a:t>29/10/15</a:t>
             </a:fld>
             <a:endParaRPr lang="en-GB"/>
           </a:p>
@@ -2701,7 +2701,7 @@
           <a:p>
             <a:fld id="{84979CAE-5A64-144B-B638-52047A26C15E}" type="datetimeFigureOut">
               <a:rPr lang="en-US" smtClean="0"/>
-              <a:t>17/09/15</a:t>
+              <a:t>29/10/15</a:t>
             </a:fld>
             <a:endParaRPr lang="en-GB"/>
           </a:p>
@@ -2954,7 +2954,7 @@
           <a:p>
             <a:fld id="{84979CAE-5A64-144B-B638-52047A26C15E}" type="datetimeFigureOut">
               <a:rPr lang="en-US" smtClean="0"/>
-              <a:t>17/09/15</a:t>
+              <a:t>29/10/15</a:t>
             </a:fld>
             <a:endParaRPr lang="en-GB"/>
           </a:p>
@@ -3167,7 +3167,7 @@
           <a:p>
             <a:fld id="{84979CAE-5A64-144B-B638-52047A26C15E}" type="datetimeFigureOut">
               <a:rPr lang="en-US" smtClean="0"/>
-              <a:t>17/09/15</a:t>
+              <a:t>29/10/15</a:t>
             </a:fld>
             <a:endParaRPr lang="en-GB"/>
           </a:p>
@@ -7516,12 +7516,20 @@
               <a:t>Christoff Bürger (</a:t>
             </a:r>
             <a:r>
+              <a:rPr lang="en-GB" sz="10000" smtClean="0">
+                <a:solidFill>
+                  <a:schemeClr val="bg1"/>
+                </a:solidFill>
+              </a:rPr>
+              <a:t>christoff.burger</a:t>
+            </a:r>
+            <a:r>
               <a:rPr lang="en-GB" sz="10000" dirty="0" err="1" smtClean="0">
                 <a:solidFill>
                   <a:schemeClr val="bg1"/>
                 </a:solidFill>
               </a:rPr>
-              <a:t>christoff.buerger@cs.lth.se</a:t>
+              <a:t>@cs.lth.se</a:t>
             </a:r>
             <a:r>
               <a:rPr lang="en-GB" sz="10000" dirty="0" smtClean="0">

</xml_diff>

<commit_message>
Examples (ttc-2015-fuml-activity-diagrams): Minor presentation slides fixes to use consistent terms with the dissertation.
</commit_message>
<xml_diff>
--- a/examples/ttc-2015-fuml-activity-diagrams/documentation/figures/solution-poster-a0.pptx
+++ b/examples/ttc-2015-fuml-activity-diagrams/documentation/figures/solution-poster-a0.pptx
@@ -192,7 +192,7 @@
           <a:p>
             <a:fld id="{8249DFA1-11E0-AC4F-B82E-E4156D0C46C6}" type="datetimeFigureOut">
               <a:rPr lang="en-US" smtClean="0"/>
-              <a:t>29/10/15</a:t>
+              <a:t>05/03/16</a:t>
             </a:fld>
             <a:endParaRPr lang="en-GB"/>
           </a:p>
@@ -730,7 +730,7 @@
           <a:p>
             <a:fld id="{84979CAE-5A64-144B-B638-52047A26C15E}" type="datetimeFigureOut">
               <a:rPr lang="en-US" smtClean="0"/>
-              <a:t>29/10/15</a:t>
+              <a:t>05/03/16</a:t>
             </a:fld>
             <a:endParaRPr lang="en-GB"/>
           </a:p>
@@ -900,7 +900,7 @@
           <a:p>
             <a:fld id="{84979CAE-5A64-144B-B638-52047A26C15E}" type="datetimeFigureOut">
               <a:rPr lang="en-US" smtClean="0"/>
-              <a:t>29/10/15</a:t>
+              <a:t>05/03/16</a:t>
             </a:fld>
             <a:endParaRPr lang="en-GB"/>
           </a:p>
@@ -1080,7 +1080,7 @@
           <a:p>
             <a:fld id="{84979CAE-5A64-144B-B638-52047A26C15E}" type="datetimeFigureOut">
               <a:rPr lang="en-US" smtClean="0"/>
-              <a:t>29/10/15</a:t>
+              <a:t>05/03/16</a:t>
             </a:fld>
             <a:endParaRPr lang="en-GB"/>
           </a:p>
@@ -1250,7 +1250,7 @@
           <a:p>
             <a:fld id="{84979CAE-5A64-144B-B638-52047A26C15E}" type="datetimeFigureOut">
               <a:rPr lang="en-US" smtClean="0"/>
-              <a:t>29/10/15</a:t>
+              <a:t>05/03/16</a:t>
             </a:fld>
             <a:endParaRPr lang="en-GB"/>
           </a:p>
@@ -1496,7 +1496,7 @@
           <a:p>
             <a:fld id="{84979CAE-5A64-144B-B638-52047A26C15E}" type="datetimeFigureOut">
               <a:rPr lang="en-US" smtClean="0"/>
-              <a:t>29/10/15</a:t>
+              <a:t>05/03/16</a:t>
             </a:fld>
             <a:endParaRPr lang="en-GB"/>
           </a:p>
@@ -1784,7 +1784,7 @@
           <a:p>
             <a:fld id="{84979CAE-5A64-144B-B638-52047A26C15E}" type="datetimeFigureOut">
               <a:rPr lang="en-US" smtClean="0"/>
-              <a:t>29/10/15</a:t>
+              <a:t>05/03/16</a:t>
             </a:fld>
             <a:endParaRPr lang="en-GB"/>
           </a:p>
@@ -2211,7 +2211,7 @@
           <a:p>
             <a:fld id="{84979CAE-5A64-144B-B638-52047A26C15E}" type="datetimeFigureOut">
               <a:rPr lang="en-US" smtClean="0"/>
-              <a:t>29/10/15</a:t>
+              <a:t>05/03/16</a:t>
             </a:fld>
             <a:endParaRPr lang="en-GB"/>
           </a:p>
@@ -2329,7 +2329,7 @@
           <a:p>
             <a:fld id="{84979CAE-5A64-144B-B638-52047A26C15E}" type="datetimeFigureOut">
               <a:rPr lang="en-US" smtClean="0"/>
-              <a:t>29/10/15</a:t>
+              <a:t>05/03/16</a:t>
             </a:fld>
             <a:endParaRPr lang="en-GB"/>
           </a:p>
@@ -2424,7 +2424,7 @@
           <a:p>
             <a:fld id="{84979CAE-5A64-144B-B638-52047A26C15E}" type="datetimeFigureOut">
               <a:rPr lang="en-US" smtClean="0"/>
-              <a:t>29/10/15</a:t>
+              <a:t>05/03/16</a:t>
             </a:fld>
             <a:endParaRPr lang="en-GB"/>
           </a:p>
@@ -2701,7 +2701,7 @@
           <a:p>
             <a:fld id="{84979CAE-5A64-144B-B638-52047A26C15E}" type="datetimeFigureOut">
               <a:rPr lang="en-US" smtClean="0"/>
-              <a:t>29/10/15</a:t>
+              <a:t>05/03/16</a:t>
             </a:fld>
             <a:endParaRPr lang="en-GB"/>
           </a:p>
@@ -2954,7 +2954,7 @@
           <a:p>
             <a:fld id="{84979CAE-5A64-144B-B638-52047A26C15E}" type="datetimeFigureOut">
               <a:rPr lang="en-US" smtClean="0"/>
-              <a:t>29/10/15</a:t>
+              <a:t>05/03/16</a:t>
             </a:fld>
             <a:endParaRPr lang="en-GB"/>
           </a:p>
@@ -3167,7 +3167,7 @@
           <a:p>
             <a:fld id="{84979CAE-5A64-144B-B638-52047A26C15E}" type="datetimeFigureOut">
               <a:rPr lang="en-US" smtClean="0"/>
-              <a:t>29/10/15</a:t>
+              <a:t>05/03/16</a:t>
             </a:fld>
             <a:endParaRPr lang="en-GB"/>
           </a:p>
@@ -3615,7 +3615,15 @@
                   <a:schemeClr val="bg1"/>
                 </a:solidFill>
               </a:rPr>
-              <a:t>  RAG-controlled Rewriting</a:t>
+              <a:t>  RAG-controlled </a:t>
+            </a:r>
+            <a:r>
+              <a:rPr lang="en-GB" sz="16000" dirty="0" smtClean="0">
+                <a:solidFill>
+                  <a:schemeClr val="bg1"/>
+                </a:solidFill>
+              </a:rPr>
+              <a:t>rewriting</a:t>
             </a:r>
             <a:endParaRPr lang="en-GB" sz="16000" dirty="0">
               <a:solidFill>
@@ -3661,7 +3669,7 @@
               <a:t>A </a:t>
             </a:r>
             <a:r>
-              <a:rPr lang="en-GB" sz="10000" i="1" dirty="0" smtClean="0">
+              <a:rPr lang="en-GB" sz="10000" i="1" smtClean="0">
                 <a:solidFill>
                   <a:schemeClr val="bg1"/>
                 </a:solidFill>
@@ -3669,12 +3677,28 @@
               <a:t>RACR</a:t>
             </a:r>
             <a:r>
+              <a:rPr lang="en-GB" sz="10000" smtClean="0">
+                <a:solidFill>
+                  <a:schemeClr val="bg1"/>
+                </a:solidFill>
+              </a:rPr>
+              <a:t> </a:t>
+            </a:r>
+            <a:r>
+              <a:rPr lang="en-GB" sz="10000" smtClean="0">
+                <a:solidFill>
+                  <a:schemeClr val="bg1"/>
+                </a:solidFill>
+              </a:rPr>
+              <a:t>solution </a:t>
+            </a:r>
+            <a:r>
               <a:rPr lang="en-GB" sz="10000" dirty="0" smtClean="0">
                 <a:solidFill>
                   <a:schemeClr val="bg1"/>
                 </a:solidFill>
               </a:rPr>
-              <a:t> Solution of the </a:t>
+              <a:t>of the </a:t>
             </a:r>
             <a:r>
               <a:rPr lang="en-GB" sz="10000" i="1" dirty="0" smtClean="0">
@@ -8959,11 +8983,19 @@
           <a:p>
             <a:r>
               <a:rPr lang="en-GB" sz="6000" i="1" dirty="0" smtClean="0"/>
-              <a:t>RACR S</a:t>
+              <a:t>RACR</a:t>
             </a:r>
             <a:r>
               <a:rPr lang="en-GB" sz="6000" dirty="0" smtClean="0"/>
-              <a:t>olution: diagram to Petri net interpreter, uses a reference attribute grammar to   </a:t>
+              <a:t> </a:t>
+            </a:r>
+            <a:r>
+              <a:rPr lang="en-GB" sz="6000" dirty="0" smtClean="0"/>
+              <a:t>solution</a:t>
+            </a:r>
+            <a:r>
+              <a:rPr lang="en-GB" sz="6000" dirty="0" smtClean="0"/>
+              <a:t>: diagram to Petri net interpreter, uses a reference attribute grammar to   </a:t>
             </a:r>
           </a:p>
           <a:p>
@@ -9193,3994 +9225,6 @@
           </a:fontRef>
         </p:style>
       </p:cxnSp>
-      <p:grpSp>
-        <p:nvGrpSpPr>
-          <p:cNvPr id="397" name="Group 396"/>
-          <p:cNvGrpSpPr/>
-          <p:nvPr/>
-        </p:nvGrpSpPr>
-        <p:grpSpPr>
-          <a:xfrm>
-            <a:off x="1503835" y="18947584"/>
-            <a:ext cx="17254688" cy="10430258"/>
-            <a:chOff x="262657" y="1238859"/>
-            <a:chExt cx="8627344" cy="5215129"/>
-          </a:xfrm>
-        </p:grpSpPr>
-        <p:sp>
-          <p:nvSpPr>
-            <p:cNvPr id="398" name="TextBox 397"/>
-            <p:cNvSpPr txBox="1"/>
-            <p:nvPr/>
-          </p:nvSpPr>
-          <p:spPr>
-            <a:xfrm>
-              <a:off x="262659" y="6130822"/>
-              <a:ext cx="8627342" cy="323166"/>
-            </a:xfrm>
-            <a:prstGeom prst="rect">
-              <a:avLst/>
-            </a:prstGeom>
-            <a:noFill/>
-          </p:spPr>
-          <p:txBody>
-            <a:bodyPr wrap="square" lIns="0" rIns="0" rtlCol="0">
-              <a:spAutoFit/>
-            </a:bodyPr>
-            <a:lstStyle/>
-            <a:p>
-              <a:pPr algn="ctr"/>
-              <a:r>
-                <a:rPr lang="en-GB" sz="3600" dirty="0" smtClean="0"/>
-                <a:t>semantic </a:t>
-              </a:r>
-              <a:r>
-                <a:rPr lang="en-GB" sz="3600" dirty="0"/>
-                <a:t>overlay graph (</a:t>
-              </a:r>
-              <a:r>
-                <a:rPr lang="en-GB" sz="3600" dirty="0" smtClean="0"/>
-                <a:t>excerpt): </a:t>
-              </a:r>
-              <a:r>
-                <a:rPr lang="en-GB" sz="3600" dirty="0" smtClean="0">
-                  <a:solidFill>
-                    <a:srgbClr val="FF0000"/>
-                  </a:solidFill>
-                  <a:ea typeface="Wingdings"/>
-                  <a:cs typeface="Wingdings"/>
-                  <a:sym typeface="Wingdings"/>
-                </a:rPr>
-                <a:t></a:t>
-              </a:r>
-              <a:r>
-                <a:rPr lang="en-GB" sz="3600" dirty="0" smtClean="0"/>
-                <a:t> name analysis  </a:t>
-              </a:r>
-              <a:r>
-                <a:rPr lang="en-GB" sz="3600" dirty="0" smtClean="0">
-                  <a:solidFill>
-                    <a:srgbClr val="3366FF"/>
-                  </a:solidFill>
-                  <a:ea typeface="Wingdings"/>
-                  <a:cs typeface="Wingdings"/>
-                  <a:sym typeface="Wingdings"/>
-                </a:rPr>
-                <a:t></a:t>
-              </a:r>
-              <a:r>
-                <a:rPr lang="en-GB" sz="3600" dirty="0" smtClean="0">
-                  <a:solidFill>
-                    <a:srgbClr val="660066"/>
-                  </a:solidFill>
-                  <a:ea typeface="Wingdings"/>
-                  <a:cs typeface="Wingdings"/>
-                  <a:sym typeface="Wingdings"/>
-                </a:rPr>
-                <a:t></a:t>
-              </a:r>
-              <a:r>
-                <a:rPr lang="en-GB" sz="3600" dirty="0" smtClean="0"/>
-                <a:t> code generation  </a:t>
-              </a:r>
-              <a:r>
-                <a:rPr lang="en-GB" sz="3600" dirty="0" smtClean="0">
-                  <a:solidFill>
-                    <a:srgbClr val="008000"/>
-                  </a:solidFill>
-                  <a:ea typeface="Wingdings"/>
-                  <a:cs typeface="Wingdings"/>
-                  <a:sym typeface="Wingdings"/>
-                </a:rPr>
-                <a:t></a:t>
-              </a:r>
-              <a:r>
-                <a:rPr lang="en-GB" sz="3600" dirty="0" smtClean="0"/>
-                <a:t> enabled analysis</a:t>
-              </a:r>
-            </a:p>
-          </p:txBody>
-        </p:sp>
-        <p:grpSp>
-          <p:nvGrpSpPr>
-            <p:cNvPr id="399" name="Group 398"/>
-            <p:cNvGrpSpPr/>
-            <p:nvPr/>
-          </p:nvGrpSpPr>
-          <p:grpSpPr>
-            <a:xfrm>
-              <a:off x="262657" y="1238859"/>
-              <a:ext cx="8627344" cy="4796852"/>
-              <a:chOff x="262657" y="1238859"/>
-              <a:chExt cx="8627344" cy="4796852"/>
-            </a:xfrm>
-          </p:grpSpPr>
-          <p:cxnSp>
-            <p:nvCxnSpPr>
-              <p:cNvPr id="400" name="Straight Connector 399"/>
-              <p:cNvCxnSpPr/>
-              <p:nvPr/>
-            </p:nvCxnSpPr>
-            <p:spPr>
-              <a:xfrm flipH="1" flipV="1">
-                <a:off x="5173246" y="1238859"/>
-                <a:ext cx="1" cy="4796852"/>
-              </a:xfrm>
-              <a:prstGeom prst="line">
-                <a:avLst/>
-              </a:prstGeom>
-              <a:ln w="19050">
-                <a:solidFill>
-                  <a:schemeClr val="tx1">
-                    <a:lumMod val="50000"/>
-                    <a:lumOff val="50000"/>
-                  </a:schemeClr>
-                </a:solidFill>
-                <a:prstDash val="sysDot"/>
-              </a:ln>
-              <a:effectLst/>
-            </p:spPr>
-            <p:style>
-              <a:lnRef idx="2">
-                <a:schemeClr val="accent1"/>
-              </a:lnRef>
-              <a:fillRef idx="0">
-                <a:schemeClr val="accent1"/>
-              </a:fillRef>
-              <a:effectRef idx="1">
-                <a:schemeClr val="accent1"/>
-              </a:effectRef>
-              <a:fontRef idx="minor">
-                <a:schemeClr val="tx1"/>
-              </a:fontRef>
-            </p:style>
-          </p:cxnSp>
-          <p:sp>
-            <p:nvSpPr>
-              <p:cNvPr id="401" name="Rectangle 400"/>
-              <p:cNvSpPr/>
-              <p:nvPr/>
-            </p:nvSpPr>
-            <p:spPr>
-              <a:xfrm>
-                <a:off x="1364652" y="1791825"/>
-                <a:ext cx="1063988" cy="457677"/>
-              </a:xfrm>
-              <a:prstGeom prst="rect">
-                <a:avLst/>
-              </a:prstGeom>
-              <a:noFill/>
-              <a:ln>
-                <a:solidFill>
-                  <a:schemeClr val="tx1"/>
-                </a:solidFill>
-              </a:ln>
-              <a:effectLst/>
-            </p:spPr>
-            <p:style>
-              <a:lnRef idx="1">
-                <a:schemeClr val="accent1"/>
-              </a:lnRef>
-              <a:fillRef idx="3">
-                <a:schemeClr val="accent1"/>
-              </a:fillRef>
-              <a:effectRef idx="2">
-                <a:schemeClr val="accent1"/>
-              </a:effectRef>
-              <a:fontRef idx="minor">
-                <a:schemeClr val="lt1"/>
-              </a:fontRef>
-            </p:style>
-            <p:txBody>
-              <a:bodyPr lIns="0" tIns="0" rIns="0" bIns="0" rtlCol="0" anchor="ctr"/>
-              <a:lstStyle/>
-              <a:p>
-                <a:pPr algn="ctr"/>
-                <a:r>
-                  <a:rPr lang="en-GB" sz="3600" dirty="0">
-                    <a:solidFill>
-                      <a:schemeClr val="tx1"/>
-                    </a:solidFill>
-                  </a:rPr>
-                  <a:t>a</a:t>
-                </a:r>
-                <a:r>
-                  <a:rPr lang="en-GB" sz="3600" dirty="0" smtClean="0">
-                    <a:solidFill>
-                      <a:schemeClr val="tx1"/>
-                    </a:solidFill>
-                  </a:rPr>
-                  <a:t>ctivity</a:t>
-                </a:r>
-                <a:endParaRPr lang="en-GB" sz="3600" dirty="0">
-                  <a:solidFill>
-                    <a:schemeClr val="tx1"/>
-                  </a:solidFill>
-                </a:endParaRPr>
-              </a:p>
-            </p:txBody>
-          </p:sp>
-          <p:sp>
-            <p:nvSpPr>
-              <p:cNvPr id="402" name="Rounded Rectangle 401"/>
-              <p:cNvSpPr/>
-              <p:nvPr/>
-            </p:nvSpPr>
-            <p:spPr>
-              <a:xfrm>
-                <a:off x="607936" y="2833041"/>
-                <a:ext cx="1018225" cy="411909"/>
-              </a:xfrm>
-              <a:prstGeom prst="roundRect">
-                <a:avLst/>
-              </a:prstGeom>
-              <a:solidFill>
-                <a:srgbClr val="FFFFFF"/>
-              </a:solidFill>
-              <a:ln>
-                <a:solidFill>
-                  <a:srgbClr val="000000"/>
-                </a:solidFill>
-              </a:ln>
-              <a:effectLst/>
-            </p:spPr>
-            <p:style>
-              <a:lnRef idx="1">
-                <a:schemeClr val="accent1"/>
-              </a:lnRef>
-              <a:fillRef idx="3">
-                <a:schemeClr val="accent1"/>
-              </a:fillRef>
-              <a:effectRef idx="2">
-                <a:schemeClr val="accent1"/>
-              </a:effectRef>
-              <a:fontRef idx="minor">
-                <a:schemeClr val="lt1"/>
-              </a:fontRef>
-            </p:style>
-            <p:txBody>
-              <a:bodyPr lIns="0" tIns="0" rIns="0" bIns="0" rtlCol="0" anchor="ctr"/>
-              <a:lstStyle/>
-              <a:p>
-                <a:pPr algn="ctr"/>
-                <a:r>
-                  <a:rPr lang="en-GB" sz="3600" dirty="0" smtClean="0">
-                    <a:solidFill>
-                      <a:srgbClr val="000000"/>
-                    </a:solidFill>
-                  </a:rPr>
-                  <a:t>variable</a:t>
-                </a:r>
-                <a:endParaRPr lang="en-GB" sz="3600" dirty="0">
-                  <a:solidFill>
-                    <a:srgbClr val="000000"/>
-                  </a:solidFill>
-                </a:endParaRPr>
-              </a:p>
-            </p:txBody>
-          </p:sp>
-          <p:sp>
-            <p:nvSpPr>
-              <p:cNvPr id="403" name="Rounded Rectangle 402"/>
-              <p:cNvSpPr/>
-              <p:nvPr/>
-            </p:nvSpPr>
-            <p:spPr>
-              <a:xfrm>
-                <a:off x="607936" y="3435332"/>
-                <a:ext cx="1018225" cy="411909"/>
-              </a:xfrm>
-              <a:prstGeom prst="roundRect">
-                <a:avLst/>
-              </a:prstGeom>
-              <a:solidFill>
-                <a:srgbClr val="FFFFFF"/>
-              </a:solidFill>
-              <a:ln>
-                <a:solidFill>
-                  <a:srgbClr val="000000"/>
-                </a:solidFill>
-              </a:ln>
-              <a:effectLst/>
-            </p:spPr>
-            <p:style>
-              <a:lnRef idx="1">
-                <a:schemeClr val="accent1"/>
-              </a:lnRef>
-              <a:fillRef idx="3">
-                <a:schemeClr val="accent1"/>
-              </a:fillRef>
-              <a:effectRef idx="2">
-                <a:schemeClr val="accent1"/>
-              </a:effectRef>
-              <a:fontRef idx="minor">
-                <a:schemeClr val="lt1"/>
-              </a:fontRef>
-            </p:style>
-            <p:txBody>
-              <a:bodyPr lIns="0" tIns="0" rIns="0" bIns="0" rtlCol="0" anchor="ctr"/>
-              <a:lstStyle/>
-              <a:p>
-                <a:pPr algn="ctr"/>
-                <a:r>
-                  <a:rPr lang="en-GB" sz="3600" dirty="0" smtClean="0">
-                    <a:solidFill>
-                      <a:srgbClr val="000000"/>
-                    </a:solidFill>
-                  </a:rPr>
-                  <a:t>variable</a:t>
-                </a:r>
-                <a:endParaRPr lang="en-GB" sz="3600" dirty="0">
-                  <a:solidFill>
-                    <a:srgbClr val="000000"/>
-                  </a:solidFill>
-                </a:endParaRPr>
-              </a:p>
-            </p:txBody>
-          </p:sp>
-          <p:sp>
-            <p:nvSpPr>
-              <p:cNvPr id="404" name="Rounded Rectangle 403"/>
-              <p:cNvSpPr/>
-              <p:nvPr/>
-            </p:nvSpPr>
-            <p:spPr>
-              <a:xfrm>
-                <a:off x="3757824" y="2833041"/>
-                <a:ext cx="1018225" cy="411909"/>
-              </a:xfrm>
-              <a:prstGeom prst="roundRect">
-                <a:avLst/>
-              </a:prstGeom>
-              <a:solidFill>
-                <a:srgbClr val="FFFFFF"/>
-              </a:solidFill>
-              <a:ln>
-                <a:solidFill>
-                  <a:srgbClr val="000000"/>
-                </a:solidFill>
-              </a:ln>
-              <a:effectLst/>
-            </p:spPr>
-            <p:style>
-              <a:lnRef idx="1">
-                <a:schemeClr val="accent1"/>
-              </a:lnRef>
-              <a:fillRef idx="3">
-                <a:schemeClr val="accent1"/>
-              </a:fillRef>
-              <a:effectRef idx="2">
-                <a:schemeClr val="accent1"/>
-              </a:effectRef>
-              <a:fontRef idx="minor">
-                <a:schemeClr val="lt1"/>
-              </a:fontRef>
-            </p:style>
-            <p:txBody>
-              <a:bodyPr lIns="0" tIns="0" rIns="0" bIns="0" rtlCol="0" anchor="ctr"/>
-              <a:lstStyle/>
-              <a:p>
-                <a:pPr algn="ctr"/>
-                <a:r>
-                  <a:rPr lang="en-GB" sz="3600" dirty="0" smtClean="0">
-                    <a:solidFill>
-                      <a:srgbClr val="000000"/>
-                    </a:solidFill>
-                  </a:rPr>
-                  <a:t>node</a:t>
-                </a:r>
-                <a:endParaRPr lang="en-GB" sz="3600" dirty="0">
-                  <a:solidFill>
-                    <a:srgbClr val="000000"/>
-                  </a:solidFill>
-                </a:endParaRPr>
-              </a:p>
-            </p:txBody>
-          </p:sp>
-          <p:sp>
-            <p:nvSpPr>
-              <p:cNvPr id="405" name="Rounded Rectangle 404"/>
-              <p:cNvSpPr/>
-              <p:nvPr/>
-            </p:nvSpPr>
-            <p:spPr>
-              <a:xfrm>
-                <a:off x="3757824" y="4053195"/>
-                <a:ext cx="1018225" cy="411909"/>
-              </a:xfrm>
-              <a:prstGeom prst="roundRect">
-                <a:avLst/>
-              </a:prstGeom>
-              <a:solidFill>
-                <a:srgbClr val="FFFFFF"/>
-              </a:solidFill>
-              <a:ln>
-                <a:solidFill>
-                  <a:srgbClr val="000000"/>
-                </a:solidFill>
-              </a:ln>
-              <a:effectLst/>
-            </p:spPr>
-            <p:style>
-              <a:lnRef idx="1">
-                <a:schemeClr val="accent1"/>
-              </a:lnRef>
-              <a:fillRef idx="3">
-                <a:schemeClr val="accent1"/>
-              </a:fillRef>
-              <a:effectRef idx="2">
-                <a:schemeClr val="accent1"/>
-              </a:effectRef>
-              <a:fontRef idx="minor">
-                <a:schemeClr val="lt1"/>
-              </a:fontRef>
-            </p:style>
-            <p:txBody>
-              <a:bodyPr lIns="0" tIns="0" rIns="0" bIns="0" rtlCol="0" anchor="ctr"/>
-              <a:lstStyle/>
-              <a:p>
-                <a:pPr algn="ctr"/>
-                <a:r>
-                  <a:rPr lang="en-GB" sz="3600" dirty="0" smtClean="0">
-                    <a:solidFill>
-                      <a:srgbClr val="000000"/>
-                    </a:solidFill>
-                  </a:rPr>
-                  <a:t>node</a:t>
-                </a:r>
-                <a:endParaRPr lang="en-GB" sz="3600" dirty="0">
-                  <a:solidFill>
-                    <a:srgbClr val="000000"/>
-                  </a:solidFill>
-                </a:endParaRPr>
-              </a:p>
-            </p:txBody>
-          </p:sp>
-          <p:sp>
-            <p:nvSpPr>
-              <p:cNvPr id="406" name="Rounded Rectangle 405"/>
-              <p:cNvSpPr/>
-              <p:nvPr/>
-            </p:nvSpPr>
-            <p:spPr>
-              <a:xfrm>
-                <a:off x="2228431" y="2833041"/>
-                <a:ext cx="1018225" cy="411909"/>
-              </a:xfrm>
-              <a:prstGeom prst="roundRect">
-                <a:avLst/>
-              </a:prstGeom>
-              <a:solidFill>
-                <a:srgbClr val="FFFFFF"/>
-              </a:solidFill>
-              <a:ln>
-                <a:solidFill>
-                  <a:srgbClr val="000000"/>
-                </a:solidFill>
-              </a:ln>
-              <a:effectLst/>
-            </p:spPr>
-            <p:style>
-              <a:lnRef idx="1">
-                <a:schemeClr val="accent1"/>
-              </a:lnRef>
-              <a:fillRef idx="3">
-                <a:schemeClr val="accent1"/>
-              </a:fillRef>
-              <a:effectRef idx="2">
-                <a:schemeClr val="accent1"/>
-              </a:effectRef>
-              <a:fontRef idx="minor">
-                <a:schemeClr val="lt1"/>
-              </a:fontRef>
-            </p:style>
-            <p:txBody>
-              <a:bodyPr lIns="0" tIns="0" rIns="0" bIns="0" rtlCol="0" anchor="ctr"/>
-              <a:lstStyle/>
-              <a:p>
-                <a:pPr algn="ctr"/>
-                <a:r>
-                  <a:rPr lang="en-GB" sz="3600" dirty="0" smtClean="0">
-                    <a:solidFill>
-                      <a:srgbClr val="000000"/>
-                    </a:solidFill>
-                  </a:rPr>
-                  <a:t>edge</a:t>
-                </a:r>
-                <a:endParaRPr lang="en-GB" sz="3600" dirty="0">
-                  <a:solidFill>
-                    <a:srgbClr val="000000"/>
-                  </a:solidFill>
-                </a:endParaRPr>
-              </a:p>
-            </p:txBody>
-          </p:sp>
-          <p:cxnSp>
-            <p:nvCxnSpPr>
-              <p:cNvPr id="407" name="Straight Connector 406"/>
-              <p:cNvCxnSpPr/>
-              <p:nvPr/>
-            </p:nvCxnSpPr>
-            <p:spPr>
-              <a:xfrm>
-                <a:off x="262658" y="2565746"/>
-                <a:ext cx="1" cy="1079195"/>
-              </a:xfrm>
-              <a:prstGeom prst="line">
-                <a:avLst/>
-              </a:prstGeom>
-              <a:ln>
-                <a:solidFill>
-                  <a:schemeClr val="tx1"/>
-                </a:solidFill>
-              </a:ln>
-              <a:effectLst/>
-            </p:spPr>
-            <p:style>
-              <a:lnRef idx="2">
-                <a:schemeClr val="accent1"/>
-              </a:lnRef>
-              <a:fillRef idx="0">
-                <a:schemeClr val="accent1"/>
-              </a:fillRef>
-              <a:effectRef idx="1">
-                <a:schemeClr val="accent1"/>
-              </a:effectRef>
-              <a:fontRef idx="minor">
-                <a:schemeClr val="tx1"/>
-              </a:fontRef>
-            </p:style>
-          </p:cxnSp>
-          <p:cxnSp>
-            <p:nvCxnSpPr>
-              <p:cNvPr id="408" name="Straight Connector 407"/>
-              <p:cNvCxnSpPr/>
-              <p:nvPr/>
-            </p:nvCxnSpPr>
-            <p:spPr>
-              <a:xfrm>
-                <a:off x="262658" y="3644941"/>
-                <a:ext cx="331785" cy="0"/>
-              </a:xfrm>
-              <a:prstGeom prst="line">
-                <a:avLst/>
-              </a:prstGeom>
-              <a:ln>
-                <a:solidFill>
-                  <a:schemeClr val="tx1"/>
-                </a:solidFill>
-              </a:ln>
-              <a:effectLst/>
-            </p:spPr>
-            <p:style>
-              <a:lnRef idx="2">
-                <a:schemeClr val="accent1"/>
-              </a:lnRef>
-              <a:fillRef idx="0">
-                <a:schemeClr val="accent1"/>
-              </a:fillRef>
-              <a:effectRef idx="1">
-                <a:schemeClr val="accent1"/>
-              </a:effectRef>
-              <a:fontRef idx="minor">
-                <a:schemeClr val="tx1"/>
-              </a:fontRef>
-            </p:style>
-          </p:cxnSp>
-          <p:cxnSp>
-            <p:nvCxnSpPr>
-              <p:cNvPr id="409" name="Straight Connector 408"/>
-              <p:cNvCxnSpPr/>
-              <p:nvPr/>
-            </p:nvCxnSpPr>
-            <p:spPr>
-              <a:xfrm>
-                <a:off x="262658" y="3049962"/>
-                <a:ext cx="331785" cy="0"/>
-              </a:xfrm>
-              <a:prstGeom prst="line">
-                <a:avLst/>
-              </a:prstGeom>
-              <a:ln>
-                <a:solidFill>
-                  <a:schemeClr val="tx1"/>
-                </a:solidFill>
-              </a:ln>
-              <a:effectLst/>
-            </p:spPr>
-            <p:style>
-              <a:lnRef idx="2">
-                <a:schemeClr val="accent1"/>
-              </a:lnRef>
-              <a:fillRef idx="0">
-                <a:schemeClr val="accent1"/>
-              </a:fillRef>
-              <a:effectRef idx="1">
-                <a:schemeClr val="accent1"/>
-              </a:effectRef>
-              <a:fontRef idx="minor">
-                <a:schemeClr val="tx1"/>
-              </a:fontRef>
-            </p:style>
-          </p:cxnSp>
-          <p:sp>
-            <p:nvSpPr>
-              <p:cNvPr id="410" name="Rounded Rectangle 409"/>
-              <p:cNvSpPr/>
-              <p:nvPr/>
-            </p:nvSpPr>
-            <p:spPr>
-              <a:xfrm>
-                <a:off x="2228431" y="3435332"/>
-                <a:ext cx="1018225" cy="411909"/>
-              </a:xfrm>
-              <a:prstGeom prst="roundRect">
-                <a:avLst/>
-              </a:prstGeom>
-              <a:solidFill>
-                <a:srgbClr val="FFFFFF"/>
-              </a:solidFill>
-              <a:ln>
-                <a:solidFill>
-                  <a:srgbClr val="000000"/>
-                </a:solidFill>
-              </a:ln>
-              <a:effectLst/>
-            </p:spPr>
-            <p:style>
-              <a:lnRef idx="1">
-                <a:schemeClr val="accent1"/>
-              </a:lnRef>
-              <a:fillRef idx="3">
-                <a:schemeClr val="accent1"/>
-              </a:fillRef>
-              <a:effectRef idx="2">
-                <a:schemeClr val="accent1"/>
-              </a:effectRef>
-              <a:fontRef idx="minor">
-                <a:schemeClr val="lt1"/>
-              </a:fontRef>
-            </p:style>
-            <p:txBody>
-              <a:bodyPr lIns="0" tIns="0" rIns="0" bIns="0" rtlCol="0" anchor="ctr"/>
-              <a:lstStyle/>
-              <a:p>
-                <a:pPr algn="ctr"/>
-                <a:r>
-                  <a:rPr lang="en-GB" sz="3600" dirty="0" smtClean="0">
-                    <a:solidFill>
-                      <a:srgbClr val="000000"/>
-                    </a:solidFill>
-                  </a:rPr>
-                  <a:t>edge</a:t>
-                </a:r>
-                <a:endParaRPr lang="en-GB" sz="3600" dirty="0">
-                  <a:solidFill>
-                    <a:srgbClr val="000000"/>
-                  </a:solidFill>
-                </a:endParaRPr>
-              </a:p>
-            </p:txBody>
-          </p:sp>
-          <p:sp>
-            <p:nvSpPr>
-              <p:cNvPr id="411" name="Rounded Rectangle 410"/>
-              <p:cNvSpPr/>
-              <p:nvPr/>
-            </p:nvSpPr>
-            <p:spPr>
-              <a:xfrm>
-                <a:off x="2228431" y="4053195"/>
-                <a:ext cx="1018225" cy="411909"/>
-              </a:xfrm>
-              <a:prstGeom prst="roundRect">
-                <a:avLst/>
-              </a:prstGeom>
-              <a:solidFill>
-                <a:srgbClr val="FFFFFF"/>
-              </a:solidFill>
-              <a:ln>
-                <a:solidFill>
-                  <a:srgbClr val="000000"/>
-                </a:solidFill>
-              </a:ln>
-              <a:effectLst/>
-            </p:spPr>
-            <p:style>
-              <a:lnRef idx="1">
-                <a:schemeClr val="accent1"/>
-              </a:lnRef>
-              <a:fillRef idx="3">
-                <a:schemeClr val="accent1"/>
-              </a:fillRef>
-              <a:effectRef idx="2">
-                <a:schemeClr val="accent1"/>
-              </a:effectRef>
-              <a:fontRef idx="minor">
-                <a:schemeClr val="lt1"/>
-              </a:fontRef>
-            </p:style>
-            <p:txBody>
-              <a:bodyPr lIns="0" tIns="0" rIns="0" bIns="0" rtlCol="0" anchor="ctr"/>
-              <a:lstStyle/>
-              <a:p>
-                <a:pPr algn="ctr"/>
-                <a:r>
-                  <a:rPr lang="en-GB" sz="3600" dirty="0" smtClean="0">
-                    <a:solidFill>
-                      <a:srgbClr val="000000"/>
-                    </a:solidFill>
-                  </a:rPr>
-                  <a:t>edge</a:t>
-                </a:r>
-                <a:endParaRPr lang="en-GB" sz="3600" dirty="0">
-                  <a:solidFill>
-                    <a:srgbClr val="000000"/>
-                  </a:solidFill>
-                </a:endParaRPr>
-              </a:p>
-            </p:txBody>
-          </p:sp>
-          <p:cxnSp>
-            <p:nvCxnSpPr>
-              <p:cNvPr id="412" name="Straight Connector 411"/>
-              <p:cNvCxnSpPr/>
-              <p:nvPr/>
-            </p:nvCxnSpPr>
-            <p:spPr>
-              <a:xfrm>
-                <a:off x="1896646" y="4266460"/>
-                <a:ext cx="331785" cy="0"/>
-              </a:xfrm>
-              <a:prstGeom prst="line">
-                <a:avLst/>
-              </a:prstGeom>
-              <a:ln>
-                <a:solidFill>
-                  <a:schemeClr val="tx1"/>
-                </a:solidFill>
-              </a:ln>
-              <a:effectLst/>
-            </p:spPr>
-            <p:style>
-              <a:lnRef idx="2">
-                <a:schemeClr val="accent1"/>
-              </a:lnRef>
-              <a:fillRef idx="0">
-                <a:schemeClr val="accent1"/>
-              </a:fillRef>
-              <a:effectRef idx="1">
-                <a:schemeClr val="accent1"/>
-              </a:effectRef>
-              <a:fontRef idx="minor">
-                <a:schemeClr val="tx1"/>
-              </a:fontRef>
-            </p:style>
-          </p:cxnSp>
-          <p:cxnSp>
-            <p:nvCxnSpPr>
-              <p:cNvPr id="413" name="Straight Connector 412"/>
-              <p:cNvCxnSpPr/>
-              <p:nvPr/>
-            </p:nvCxnSpPr>
-            <p:spPr>
-              <a:xfrm>
-                <a:off x="1896646" y="3671005"/>
-                <a:ext cx="331785" cy="0"/>
-              </a:xfrm>
-              <a:prstGeom prst="line">
-                <a:avLst/>
-              </a:prstGeom>
-              <a:ln>
-                <a:solidFill>
-                  <a:schemeClr val="tx1"/>
-                </a:solidFill>
-              </a:ln>
-              <a:effectLst/>
-            </p:spPr>
-            <p:style>
-              <a:lnRef idx="2">
-                <a:schemeClr val="accent1"/>
-              </a:lnRef>
-              <a:fillRef idx="0">
-                <a:schemeClr val="accent1"/>
-              </a:fillRef>
-              <a:effectRef idx="1">
-                <a:schemeClr val="accent1"/>
-              </a:effectRef>
-              <a:fontRef idx="minor">
-                <a:schemeClr val="tx1"/>
-              </a:fontRef>
-            </p:style>
-          </p:cxnSp>
-          <p:cxnSp>
-            <p:nvCxnSpPr>
-              <p:cNvPr id="414" name="Straight Connector 413"/>
-              <p:cNvCxnSpPr/>
-              <p:nvPr/>
-            </p:nvCxnSpPr>
-            <p:spPr>
-              <a:xfrm>
-                <a:off x="1896646" y="3053142"/>
-                <a:ext cx="331785" cy="0"/>
-              </a:xfrm>
-              <a:prstGeom prst="line">
-                <a:avLst/>
-              </a:prstGeom>
-              <a:ln>
-                <a:solidFill>
-                  <a:schemeClr val="tx1"/>
-                </a:solidFill>
-              </a:ln>
-              <a:effectLst/>
-            </p:spPr>
-            <p:style>
-              <a:lnRef idx="2">
-                <a:schemeClr val="accent1"/>
-              </a:lnRef>
-              <a:fillRef idx="0">
-                <a:schemeClr val="accent1"/>
-              </a:fillRef>
-              <a:effectRef idx="1">
-                <a:schemeClr val="accent1"/>
-              </a:effectRef>
-              <a:fontRef idx="minor">
-                <a:schemeClr val="tx1"/>
-              </a:fontRef>
-            </p:style>
-          </p:cxnSp>
-          <p:cxnSp>
-            <p:nvCxnSpPr>
-              <p:cNvPr id="415" name="Straight Connector 414"/>
-              <p:cNvCxnSpPr/>
-              <p:nvPr/>
-            </p:nvCxnSpPr>
-            <p:spPr>
-              <a:xfrm>
-                <a:off x="1896646" y="4872882"/>
-                <a:ext cx="331785" cy="0"/>
-              </a:xfrm>
-              <a:prstGeom prst="line">
-                <a:avLst/>
-              </a:prstGeom>
-              <a:ln>
-                <a:solidFill>
-                  <a:schemeClr val="tx1"/>
-                </a:solidFill>
-              </a:ln>
-              <a:effectLst/>
-            </p:spPr>
-            <p:style>
-              <a:lnRef idx="2">
-                <a:schemeClr val="accent1"/>
-              </a:lnRef>
-              <a:fillRef idx="0">
-                <a:schemeClr val="accent1"/>
-              </a:fillRef>
-              <a:effectRef idx="1">
-                <a:schemeClr val="accent1"/>
-              </a:effectRef>
-              <a:fontRef idx="minor">
-                <a:schemeClr val="tx1"/>
-              </a:fontRef>
-            </p:style>
-          </p:cxnSp>
-          <p:sp>
-            <p:nvSpPr>
-              <p:cNvPr id="416" name="Rounded Rectangle 415"/>
-              <p:cNvSpPr/>
-              <p:nvPr/>
-            </p:nvSpPr>
-            <p:spPr>
-              <a:xfrm>
-                <a:off x="3757824" y="4674714"/>
-                <a:ext cx="1018225" cy="411909"/>
-              </a:xfrm>
-              <a:prstGeom prst="roundRect">
-                <a:avLst/>
-              </a:prstGeom>
-              <a:solidFill>
-                <a:srgbClr val="FFFFFF"/>
-              </a:solidFill>
-              <a:ln>
-                <a:solidFill>
-                  <a:srgbClr val="000000"/>
-                </a:solidFill>
-              </a:ln>
-              <a:effectLst/>
-            </p:spPr>
-            <p:style>
-              <a:lnRef idx="1">
-                <a:schemeClr val="accent1"/>
-              </a:lnRef>
-              <a:fillRef idx="3">
-                <a:schemeClr val="accent1"/>
-              </a:fillRef>
-              <a:effectRef idx="2">
-                <a:schemeClr val="accent1"/>
-              </a:effectRef>
-              <a:fontRef idx="minor">
-                <a:schemeClr val="lt1"/>
-              </a:fontRef>
-            </p:style>
-            <p:txBody>
-              <a:bodyPr lIns="0" tIns="0" rIns="0" bIns="0" rtlCol="0" anchor="ctr"/>
-              <a:lstStyle/>
-              <a:p>
-                <a:pPr algn="ctr"/>
-                <a:r>
-                  <a:rPr lang="en-GB" sz="3600" dirty="0" smtClean="0">
-                    <a:solidFill>
-                      <a:srgbClr val="000000"/>
-                    </a:solidFill>
-                  </a:rPr>
-                  <a:t>node</a:t>
-                </a:r>
-                <a:endParaRPr lang="en-GB" sz="3600" dirty="0">
-                  <a:solidFill>
-                    <a:srgbClr val="000000"/>
-                  </a:solidFill>
-                </a:endParaRPr>
-              </a:p>
-            </p:txBody>
-          </p:sp>
-          <p:sp>
-            <p:nvSpPr>
-              <p:cNvPr id="417" name="Rounded Rectangle 416"/>
-              <p:cNvSpPr/>
-              <p:nvPr/>
-            </p:nvSpPr>
-            <p:spPr>
-              <a:xfrm>
-                <a:off x="2228431" y="4662321"/>
-                <a:ext cx="1018225" cy="411909"/>
-              </a:xfrm>
-              <a:prstGeom prst="roundRect">
-                <a:avLst/>
-              </a:prstGeom>
-              <a:solidFill>
-                <a:srgbClr val="FFFFFF"/>
-              </a:solidFill>
-              <a:ln>
-                <a:solidFill>
-                  <a:srgbClr val="000000"/>
-                </a:solidFill>
-              </a:ln>
-              <a:effectLst/>
-            </p:spPr>
-            <p:style>
-              <a:lnRef idx="1">
-                <a:schemeClr val="accent1"/>
-              </a:lnRef>
-              <a:fillRef idx="3">
-                <a:schemeClr val="accent1"/>
-              </a:fillRef>
-              <a:effectRef idx="2">
-                <a:schemeClr val="accent1"/>
-              </a:effectRef>
-              <a:fontRef idx="minor">
-                <a:schemeClr val="lt1"/>
-              </a:fontRef>
-            </p:style>
-            <p:txBody>
-              <a:bodyPr lIns="0" tIns="0" rIns="0" bIns="0" rtlCol="0" anchor="ctr"/>
-              <a:lstStyle/>
-              <a:p>
-                <a:pPr algn="ctr"/>
-                <a:r>
-                  <a:rPr lang="en-GB" sz="3600" dirty="0" smtClean="0">
-                    <a:solidFill>
-                      <a:srgbClr val="000000"/>
-                    </a:solidFill>
-                  </a:rPr>
-                  <a:t>edge</a:t>
-                </a:r>
-                <a:endParaRPr lang="en-GB" sz="3600" dirty="0">
-                  <a:solidFill>
-                    <a:srgbClr val="000000"/>
-                  </a:solidFill>
-                </a:endParaRPr>
-              </a:p>
-            </p:txBody>
-          </p:sp>
-          <p:cxnSp>
-            <p:nvCxnSpPr>
-              <p:cNvPr id="418" name="Straight Connector 417"/>
-              <p:cNvCxnSpPr/>
-              <p:nvPr/>
-            </p:nvCxnSpPr>
-            <p:spPr>
-              <a:xfrm>
-                <a:off x="3426039" y="3044880"/>
-                <a:ext cx="331785" cy="0"/>
-              </a:xfrm>
-              <a:prstGeom prst="line">
-                <a:avLst/>
-              </a:prstGeom>
-              <a:ln>
-                <a:solidFill>
-                  <a:schemeClr val="tx1"/>
-                </a:solidFill>
-              </a:ln>
-              <a:effectLst/>
-            </p:spPr>
-            <p:style>
-              <a:lnRef idx="2">
-                <a:schemeClr val="accent1"/>
-              </a:lnRef>
-              <a:fillRef idx="0">
-                <a:schemeClr val="accent1"/>
-              </a:fillRef>
-              <a:effectRef idx="1">
-                <a:schemeClr val="accent1"/>
-              </a:effectRef>
-              <a:fontRef idx="minor">
-                <a:schemeClr val="tx1"/>
-              </a:fontRef>
-            </p:style>
-          </p:cxnSp>
-          <p:cxnSp>
-            <p:nvCxnSpPr>
-              <p:cNvPr id="419" name="Straight Connector 418"/>
-              <p:cNvCxnSpPr/>
-              <p:nvPr/>
-            </p:nvCxnSpPr>
-            <p:spPr>
-              <a:xfrm>
-                <a:off x="3426039" y="4266460"/>
-                <a:ext cx="331785" cy="0"/>
-              </a:xfrm>
-              <a:prstGeom prst="line">
-                <a:avLst/>
-              </a:prstGeom>
-              <a:ln>
-                <a:solidFill>
-                  <a:schemeClr val="tx1"/>
-                </a:solidFill>
-              </a:ln>
-              <a:effectLst/>
-            </p:spPr>
-            <p:style>
-              <a:lnRef idx="2">
-                <a:schemeClr val="accent1"/>
-              </a:lnRef>
-              <a:fillRef idx="0">
-                <a:schemeClr val="accent1"/>
-              </a:fillRef>
-              <a:effectRef idx="1">
-                <a:schemeClr val="accent1"/>
-              </a:effectRef>
-              <a:fontRef idx="minor">
-                <a:schemeClr val="tx1"/>
-              </a:fontRef>
-            </p:style>
-          </p:cxnSp>
-          <p:cxnSp>
-            <p:nvCxnSpPr>
-              <p:cNvPr id="420" name="Straight Connector 419"/>
-              <p:cNvCxnSpPr/>
-              <p:nvPr/>
-            </p:nvCxnSpPr>
-            <p:spPr>
-              <a:xfrm>
-                <a:off x="3426039" y="4902126"/>
-                <a:ext cx="331785" cy="0"/>
-              </a:xfrm>
-              <a:prstGeom prst="line">
-                <a:avLst/>
-              </a:prstGeom>
-              <a:ln>
-                <a:solidFill>
-                  <a:schemeClr val="tx1"/>
-                </a:solidFill>
-              </a:ln>
-              <a:effectLst/>
-            </p:spPr>
-            <p:style>
-              <a:lnRef idx="2">
-                <a:schemeClr val="accent1"/>
-              </a:lnRef>
-              <a:fillRef idx="0">
-                <a:schemeClr val="accent1"/>
-              </a:fillRef>
-              <a:effectRef idx="1">
-                <a:schemeClr val="accent1"/>
-              </a:effectRef>
-              <a:fontRef idx="minor">
-                <a:schemeClr val="tx1"/>
-              </a:fontRef>
-            </p:style>
-          </p:cxnSp>
-          <p:cxnSp>
-            <p:nvCxnSpPr>
-              <p:cNvPr id="421" name="Straight Connector 420"/>
-              <p:cNvCxnSpPr>
-                <a:endCxn id="401" idx="2"/>
-              </p:cNvCxnSpPr>
-              <p:nvPr/>
-            </p:nvCxnSpPr>
-            <p:spPr>
-              <a:xfrm flipV="1">
-                <a:off x="1896646" y="2249502"/>
-                <a:ext cx="0" cy="2623380"/>
-              </a:xfrm>
-              <a:prstGeom prst="line">
-                <a:avLst/>
-              </a:prstGeom>
-              <a:ln>
-                <a:solidFill>
-                  <a:schemeClr val="tx1"/>
-                </a:solidFill>
-              </a:ln>
-              <a:effectLst/>
-            </p:spPr>
-            <p:style>
-              <a:lnRef idx="2">
-                <a:schemeClr val="accent1"/>
-              </a:lnRef>
-              <a:fillRef idx="0">
-                <a:schemeClr val="accent1"/>
-              </a:fillRef>
-              <a:effectRef idx="1">
-                <a:schemeClr val="accent1"/>
-              </a:effectRef>
-              <a:fontRef idx="minor">
-                <a:schemeClr val="tx1"/>
-              </a:fontRef>
-            </p:style>
-          </p:cxnSp>
-          <p:cxnSp>
-            <p:nvCxnSpPr>
-              <p:cNvPr id="422" name="Straight Connector 421"/>
-              <p:cNvCxnSpPr/>
-              <p:nvPr/>
-            </p:nvCxnSpPr>
-            <p:spPr>
-              <a:xfrm flipV="1">
-                <a:off x="3426039" y="2565747"/>
-                <a:ext cx="0" cy="2336379"/>
-              </a:xfrm>
-              <a:prstGeom prst="line">
-                <a:avLst/>
-              </a:prstGeom>
-              <a:ln>
-                <a:solidFill>
-                  <a:schemeClr val="tx1"/>
-                </a:solidFill>
-              </a:ln>
-              <a:effectLst/>
-            </p:spPr>
-            <p:style>
-              <a:lnRef idx="2">
-                <a:schemeClr val="accent1"/>
-              </a:lnRef>
-              <a:fillRef idx="0">
-                <a:schemeClr val="accent1"/>
-              </a:fillRef>
-              <a:effectRef idx="1">
-                <a:schemeClr val="accent1"/>
-              </a:effectRef>
-              <a:fontRef idx="minor">
-                <a:schemeClr val="tx1"/>
-              </a:fontRef>
-            </p:style>
-          </p:cxnSp>
-          <p:cxnSp>
-            <p:nvCxnSpPr>
-              <p:cNvPr id="423" name="Straight Connector 422"/>
-              <p:cNvCxnSpPr/>
-              <p:nvPr/>
-            </p:nvCxnSpPr>
-            <p:spPr>
-              <a:xfrm flipV="1">
-                <a:off x="276151" y="2565746"/>
-                <a:ext cx="3149888" cy="1"/>
-              </a:xfrm>
-              <a:prstGeom prst="line">
-                <a:avLst/>
-              </a:prstGeom>
-              <a:ln>
-                <a:solidFill>
-                  <a:schemeClr val="tx1"/>
-                </a:solidFill>
-              </a:ln>
-              <a:effectLst/>
-            </p:spPr>
-            <p:style>
-              <a:lnRef idx="2">
-                <a:schemeClr val="accent1"/>
-              </a:lnRef>
-              <a:fillRef idx="0">
-                <a:schemeClr val="accent1"/>
-              </a:fillRef>
-              <a:effectRef idx="1">
-                <a:schemeClr val="accent1"/>
-              </a:effectRef>
-              <a:fontRef idx="minor">
-                <a:schemeClr val="tx1"/>
-              </a:fontRef>
-            </p:style>
-          </p:cxnSp>
-          <p:sp>
-            <p:nvSpPr>
-              <p:cNvPr id="424" name="TextBox 423"/>
-              <p:cNvSpPr txBox="1"/>
-              <p:nvPr/>
-            </p:nvSpPr>
-            <p:spPr>
-              <a:xfrm>
-                <a:off x="3662522" y="3299431"/>
-                <a:ext cx="925945" cy="323166"/>
-              </a:xfrm>
-              <a:prstGeom prst="rect">
-                <a:avLst/>
-              </a:prstGeom>
-              <a:noFill/>
-            </p:spPr>
-            <p:txBody>
-              <a:bodyPr wrap="none" rtlCol="0">
-                <a:spAutoFit/>
-              </a:bodyPr>
-              <a:lstStyle/>
-              <a:p>
-                <a:r>
-                  <a:rPr lang="en-GB" sz="3600" dirty="0" smtClean="0">
-                    <a:solidFill>
-                      <a:srgbClr val="FF0000"/>
-                    </a:solidFill>
-                  </a:rPr>
-                  <a:t>outgoing</a:t>
-                </a:r>
-                <a:endParaRPr lang="en-GB" sz="3600" dirty="0">
-                  <a:solidFill>
-                    <a:srgbClr val="FF0000"/>
-                  </a:solidFill>
-                </a:endParaRPr>
-              </a:p>
-            </p:txBody>
-          </p:sp>
-          <p:sp>
-            <p:nvSpPr>
-              <p:cNvPr id="425" name="Rounded Rectangle 424"/>
-              <p:cNvSpPr/>
-              <p:nvPr/>
-            </p:nvSpPr>
-            <p:spPr>
-              <a:xfrm>
-                <a:off x="4096961" y="5281610"/>
-                <a:ext cx="679088" cy="303850"/>
-              </a:xfrm>
-              <a:prstGeom prst="roundRect">
-                <a:avLst/>
-              </a:prstGeom>
-              <a:solidFill>
-                <a:srgbClr val="FFFFFF"/>
-              </a:solidFill>
-              <a:ln>
-                <a:solidFill>
-                  <a:srgbClr val="000000"/>
-                </a:solidFill>
-              </a:ln>
-              <a:effectLst/>
-            </p:spPr>
-            <p:style>
-              <a:lnRef idx="1">
-                <a:schemeClr val="accent1"/>
-              </a:lnRef>
-              <a:fillRef idx="3">
-                <a:schemeClr val="accent1"/>
-              </a:fillRef>
-              <a:effectRef idx="2">
-                <a:schemeClr val="accent1"/>
-              </a:effectRef>
-              <a:fontRef idx="minor">
-                <a:schemeClr val="lt1"/>
-              </a:fontRef>
-            </p:style>
-            <p:txBody>
-              <a:bodyPr lIns="0" tIns="0" rIns="0" bIns="0" rtlCol="0" anchor="ctr"/>
-              <a:lstStyle/>
-              <a:p>
-                <a:pPr algn="ctr"/>
-                <a:r>
-                  <a:rPr lang="en-GB" sz="3600" dirty="0" err="1">
-                    <a:solidFill>
-                      <a:srgbClr val="000000"/>
-                    </a:solidFill>
-                  </a:rPr>
-                  <a:t>e</a:t>
-                </a:r>
-                <a:r>
-                  <a:rPr lang="en-GB" sz="3600" dirty="0" err="1" smtClean="0">
-                    <a:solidFill>
-                      <a:srgbClr val="000000"/>
-                    </a:solidFill>
-                  </a:rPr>
-                  <a:t>xpr</a:t>
-                </a:r>
-                <a:r>
-                  <a:rPr lang="en-GB" sz="3600" dirty="0" smtClean="0">
-                    <a:solidFill>
-                      <a:srgbClr val="000000"/>
-                    </a:solidFill>
-                  </a:rPr>
-                  <a:t>.</a:t>
-                </a:r>
-                <a:endParaRPr lang="en-GB" sz="3600" dirty="0">
-                  <a:solidFill>
-                    <a:srgbClr val="000000"/>
-                  </a:solidFill>
-                </a:endParaRPr>
-              </a:p>
-            </p:txBody>
-          </p:sp>
-          <p:cxnSp>
-            <p:nvCxnSpPr>
-              <p:cNvPr id="426" name="Straight Connector 425"/>
-              <p:cNvCxnSpPr>
-                <a:endCxn id="425" idx="1"/>
-              </p:cNvCxnSpPr>
-              <p:nvPr/>
-            </p:nvCxnSpPr>
-            <p:spPr>
-              <a:xfrm>
-                <a:off x="3960072" y="5433535"/>
-                <a:ext cx="136889" cy="0"/>
-              </a:xfrm>
-              <a:prstGeom prst="line">
-                <a:avLst/>
-              </a:prstGeom>
-              <a:ln>
-                <a:solidFill>
-                  <a:schemeClr val="tx1"/>
-                </a:solidFill>
-              </a:ln>
-              <a:effectLst/>
-            </p:spPr>
-            <p:style>
-              <a:lnRef idx="2">
-                <a:schemeClr val="accent1"/>
-              </a:lnRef>
-              <a:fillRef idx="0">
-                <a:schemeClr val="accent1"/>
-              </a:fillRef>
-              <a:effectRef idx="1">
-                <a:schemeClr val="accent1"/>
-              </a:effectRef>
-              <a:fontRef idx="minor">
-                <a:schemeClr val="tx1"/>
-              </a:fontRef>
-            </p:style>
-          </p:cxnSp>
-          <p:cxnSp>
-            <p:nvCxnSpPr>
-              <p:cNvPr id="427" name="Straight Connector 426"/>
-              <p:cNvCxnSpPr/>
-              <p:nvPr/>
-            </p:nvCxnSpPr>
-            <p:spPr>
-              <a:xfrm flipV="1">
-                <a:off x="3960072" y="5074230"/>
-                <a:ext cx="0" cy="359305"/>
-              </a:xfrm>
-              <a:prstGeom prst="line">
-                <a:avLst/>
-              </a:prstGeom>
-              <a:ln>
-                <a:solidFill>
-                  <a:schemeClr val="tx1"/>
-                </a:solidFill>
-              </a:ln>
-              <a:effectLst/>
-            </p:spPr>
-            <p:style>
-              <a:lnRef idx="2">
-                <a:schemeClr val="accent1"/>
-              </a:lnRef>
-              <a:fillRef idx="0">
-                <a:schemeClr val="accent1"/>
-              </a:fillRef>
-              <a:effectRef idx="1">
-                <a:schemeClr val="accent1"/>
-              </a:effectRef>
-              <a:fontRef idx="minor">
-                <a:schemeClr val="tx1"/>
-              </a:fontRef>
-            </p:style>
-          </p:cxnSp>
-          <p:sp>
-            <p:nvSpPr>
-              <p:cNvPr id="428" name="Isosceles Triangle 427"/>
-              <p:cNvSpPr/>
-              <p:nvPr/>
-            </p:nvSpPr>
-            <p:spPr>
-              <a:xfrm>
-                <a:off x="4096961" y="5585460"/>
-                <a:ext cx="679088" cy="181316"/>
-              </a:xfrm>
-              <a:prstGeom prst="triangle">
-                <a:avLst/>
-              </a:prstGeom>
-              <a:noFill/>
-              <a:ln>
-                <a:solidFill>
-                  <a:srgbClr val="000000"/>
-                </a:solidFill>
-              </a:ln>
-            </p:spPr>
-            <p:style>
-              <a:lnRef idx="1">
-                <a:schemeClr val="accent1"/>
-              </a:lnRef>
-              <a:fillRef idx="3">
-                <a:schemeClr val="accent1"/>
-              </a:fillRef>
-              <a:effectRef idx="2">
-                <a:schemeClr val="accent1"/>
-              </a:effectRef>
-              <a:fontRef idx="minor">
-                <a:schemeClr val="lt1"/>
-              </a:fontRef>
-            </p:style>
-            <p:txBody>
-              <a:bodyPr rtlCol="0" anchor="ctr"/>
-              <a:lstStyle/>
-              <a:p>
-                <a:pPr algn="ctr"/>
-                <a:endParaRPr lang="en-GB" sz="3600"/>
-              </a:p>
-            </p:txBody>
-          </p:sp>
-          <p:cxnSp>
-            <p:nvCxnSpPr>
-              <p:cNvPr id="429" name="Straight Connector 428"/>
-              <p:cNvCxnSpPr/>
-              <p:nvPr/>
-            </p:nvCxnSpPr>
-            <p:spPr>
-              <a:xfrm>
-                <a:off x="1117049" y="5729312"/>
-                <a:ext cx="3322311" cy="1"/>
-              </a:xfrm>
-              <a:prstGeom prst="line">
-                <a:avLst/>
-              </a:prstGeom>
-              <a:ln>
-                <a:solidFill>
-                  <a:srgbClr val="FF0000"/>
-                </a:solidFill>
-              </a:ln>
-              <a:effectLst/>
-            </p:spPr>
-            <p:style>
-              <a:lnRef idx="2">
-                <a:schemeClr val="accent1"/>
-              </a:lnRef>
-              <a:fillRef idx="0">
-                <a:schemeClr val="accent1"/>
-              </a:fillRef>
-              <a:effectRef idx="1">
-                <a:schemeClr val="accent1"/>
-              </a:effectRef>
-              <a:fontRef idx="minor">
-                <a:schemeClr val="tx1"/>
-              </a:fontRef>
-            </p:style>
-          </p:cxnSp>
-          <p:cxnSp>
-            <p:nvCxnSpPr>
-              <p:cNvPr id="430" name="Straight Connector 429"/>
-              <p:cNvCxnSpPr>
-                <a:stCxn id="403" idx="2"/>
-              </p:cNvCxnSpPr>
-              <p:nvPr/>
-            </p:nvCxnSpPr>
-            <p:spPr>
-              <a:xfrm>
-                <a:off x="1117049" y="3847241"/>
-                <a:ext cx="0" cy="1882071"/>
-              </a:xfrm>
-              <a:prstGeom prst="line">
-                <a:avLst/>
-              </a:prstGeom>
-              <a:ln>
-                <a:solidFill>
-                  <a:srgbClr val="FF0000"/>
-                </a:solidFill>
-                <a:headEnd type="triangle" w="lg" len="lg"/>
-                <a:tailEnd type="none"/>
-              </a:ln>
-              <a:effectLst/>
-            </p:spPr>
-            <p:style>
-              <a:lnRef idx="2">
-                <a:schemeClr val="accent1"/>
-              </a:lnRef>
-              <a:fillRef idx="0">
-                <a:schemeClr val="accent1"/>
-              </a:fillRef>
-              <a:effectRef idx="1">
-                <a:schemeClr val="accent1"/>
-              </a:effectRef>
-              <a:fontRef idx="minor">
-                <a:schemeClr val="tx1"/>
-              </a:fontRef>
-            </p:style>
-          </p:cxnSp>
-          <p:cxnSp>
-            <p:nvCxnSpPr>
-              <p:cNvPr id="431" name="Straight Connector 430"/>
-              <p:cNvCxnSpPr/>
-              <p:nvPr/>
-            </p:nvCxnSpPr>
-            <p:spPr>
-              <a:xfrm flipH="1" flipV="1">
-                <a:off x="3246658" y="2678661"/>
-                <a:ext cx="286675" cy="1039"/>
-              </a:xfrm>
-              <a:prstGeom prst="line">
-                <a:avLst/>
-              </a:prstGeom>
-              <a:ln>
-                <a:solidFill>
-                  <a:srgbClr val="FF0000"/>
-                </a:solidFill>
-              </a:ln>
-              <a:effectLst/>
-            </p:spPr>
-            <p:style>
-              <a:lnRef idx="2">
-                <a:schemeClr val="accent1"/>
-              </a:lnRef>
-              <a:fillRef idx="0">
-                <a:schemeClr val="accent1"/>
-              </a:fillRef>
-              <a:effectRef idx="1">
-                <a:schemeClr val="accent1"/>
-              </a:effectRef>
-              <a:fontRef idx="minor">
-                <a:schemeClr val="tx1"/>
-              </a:fontRef>
-            </p:style>
-          </p:cxnSp>
-          <p:cxnSp>
-            <p:nvCxnSpPr>
-              <p:cNvPr id="432" name="Straight Connector 431"/>
-              <p:cNvCxnSpPr>
-                <a:stCxn id="406" idx="0"/>
-              </p:cNvCxnSpPr>
-              <p:nvPr/>
-            </p:nvCxnSpPr>
-            <p:spPr>
-              <a:xfrm flipV="1">
-                <a:off x="2737544" y="2679700"/>
-                <a:ext cx="509112" cy="153341"/>
-              </a:xfrm>
-              <a:prstGeom prst="line">
-                <a:avLst/>
-              </a:prstGeom>
-              <a:ln>
-                <a:solidFill>
-                  <a:srgbClr val="FF0000"/>
-                </a:solidFill>
-                <a:headEnd type="triangle" w="lg" len="lg"/>
-                <a:tailEnd type="none"/>
-              </a:ln>
-              <a:effectLst/>
-            </p:spPr>
-            <p:style>
-              <a:lnRef idx="2">
-                <a:schemeClr val="accent1"/>
-              </a:lnRef>
-              <a:fillRef idx="0">
-                <a:schemeClr val="accent1"/>
-              </a:fillRef>
-              <a:effectRef idx="1">
-                <a:schemeClr val="accent1"/>
-              </a:effectRef>
-              <a:fontRef idx="minor">
-                <a:schemeClr val="tx1"/>
-              </a:fontRef>
-            </p:style>
-          </p:cxnSp>
-          <p:cxnSp>
-            <p:nvCxnSpPr>
-              <p:cNvPr id="433" name="Straight Connector 432"/>
-              <p:cNvCxnSpPr>
-                <a:stCxn id="410" idx="3"/>
-              </p:cNvCxnSpPr>
-              <p:nvPr/>
-            </p:nvCxnSpPr>
-            <p:spPr>
-              <a:xfrm>
-                <a:off x="3246656" y="3641287"/>
-                <a:ext cx="372844" cy="3654"/>
-              </a:xfrm>
-              <a:prstGeom prst="line">
-                <a:avLst/>
-              </a:prstGeom>
-              <a:ln>
-                <a:solidFill>
-                  <a:srgbClr val="FF0000"/>
-                </a:solidFill>
-                <a:headEnd type="triangle" w="lg" len="lg"/>
-                <a:tailEnd type="none"/>
-              </a:ln>
-              <a:effectLst/>
-            </p:spPr>
-            <p:style>
-              <a:lnRef idx="2">
-                <a:schemeClr val="accent1"/>
-              </a:lnRef>
-              <a:fillRef idx="0">
-                <a:schemeClr val="accent1"/>
-              </a:fillRef>
-              <a:effectRef idx="1">
-                <a:schemeClr val="accent1"/>
-              </a:effectRef>
-              <a:fontRef idx="minor">
-                <a:schemeClr val="tx1"/>
-              </a:fontRef>
-            </p:style>
-          </p:cxnSp>
-          <p:cxnSp>
-            <p:nvCxnSpPr>
-              <p:cNvPr id="434" name="Straight Connector 433"/>
-              <p:cNvCxnSpPr/>
-              <p:nvPr/>
-            </p:nvCxnSpPr>
-            <p:spPr>
-              <a:xfrm flipV="1">
-                <a:off x="3246658" y="3244950"/>
-                <a:ext cx="511166" cy="1451221"/>
-              </a:xfrm>
-              <a:prstGeom prst="line">
-                <a:avLst/>
-              </a:prstGeom>
-              <a:ln>
-                <a:solidFill>
-                  <a:srgbClr val="FF0000"/>
-                </a:solidFill>
-                <a:headEnd type="triangle" w="lg" len="lg"/>
-                <a:tailEnd type="none"/>
-              </a:ln>
-              <a:effectLst/>
-            </p:spPr>
-            <p:style>
-              <a:lnRef idx="2">
-                <a:schemeClr val="accent1"/>
-              </a:lnRef>
-              <a:fillRef idx="0">
-                <a:schemeClr val="accent1"/>
-              </a:fillRef>
-              <a:effectRef idx="1">
-                <a:schemeClr val="accent1"/>
-              </a:effectRef>
-              <a:fontRef idx="minor">
-                <a:schemeClr val="tx1"/>
-              </a:fontRef>
-            </p:style>
-          </p:cxnSp>
-          <p:sp>
-            <p:nvSpPr>
-              <p:cNvPr id="435" name="Rectangle 434"/>
-              <p:cNvSpPr/>
-              <p:nvPr/>
-            </p:nvSpPr>
-            <p:spPr>
-              <a:xfrm>
-                <a:off x="5868836" y="1791825"/>
-                <a:ext cx="1063988" cy="457677"/>
-              </a:xfrm>
-              <a:prstGeom prst="rect">
-                <a:avLst/>
-              </a:prstGeom>
-              <a:noFill/>
-              <a:ln>
-                <a:solidFill>
-                  <a:srgbClr val="660066"/>
-                </a:solidFill>
-              </a:ln>
-              <a:effectLst/>
-            </p:spPr>
-            <p:style>
-              <a:lnRef idx="1">
-                <a:schemeClr val="accent1"/>
-              </a:lnRef>
-              <a:fillRef idx="3">
-                <a:schemeClr val="accent1"/>
-              </a:fillRef>
-              <a:effectRef idx="2">
-                <a:schemeClr val="accent1"/>
-              </a:effectRef>
-              <a:fontRef idx="minor">
-                <a:schemeClr val="lt1"/>
-              </a:fontRef>
-            </p:style>
-            <p:txBody>
-              <a:bodyPr lIns="0" tIns="0" rIns="0" bIns="0" rtlCol="0" anchor="ctr"/>
-              <a:lstStyle/>
-              <a:p>
-                <a:pPr algn="ctr"/>
-                <a:r>
-                  <a:rPr lang="en-GB" sz="3600" dirty="0" smtClean="0">
-                    <a:solidFill>
-                      <a:srgbClr val="660066"/>
-                    </a:solidFill>
-                  </a:rPr>
-                  <a:t>Petri net</a:t>
-                </a:r>
-                <a:endParaRPr lang="en-GB" sz="3600" dirty="0">
-                  <a:solidFill>
-                    <a:srgbClr val="660066"/>
-                  </a:solidFill>
-                </a:endParaRPr>
-              </a:p>
-            </p:txBody>
-          </p:sp>
-          <p:sp>
-            <p:nvSpPr>
-              <p:cNvPr id="436" name="Rounded Rectangle 435"/>
-              <p:cNvSpPr/>
-              <p:nvPr/>
-            </p:nvSpPr>
-            <p:spPr>
-              <a:xfrm>
-                <a:off x="5904124" y="2833041"/>
-                <a:ext cx="1018225" cy="411909"/>
-              </a:xfrm>
-              <a:prstGeom prst="roundRect">
-                <a:avLst/>
-              </a:prstGeom>
-              <a:solidFill>
-                <a:srgbClr val="FFFFFF"/>
-              </a:solidFill>
-              <a:ln>
-                <a:solidFill>
-                  <a:srgbClr val="660066"/>
-                </a:solidFill>
-              </a:ln>
-              <a:effectLst/>
-            </p:spPr>
-            <p:style>
-              <a:lnRef idx="1">
-                <a:schemeClr val="accent1"/>
-              </a:lnRef>
-              <a:fillRef idx="3">
-                <a:schemeClr val="accent1"/>
-              </a:fillRef>
-              <a:effectRef idx="2">
-                <a:schemeClr val="accent1"/>
-              </a:effectRef>
-              <a:fontRef idx="minor">
-                <a:schemeClr val="lt1"/>
-              </a:fontRef>
-            </p:style>
-            <p:txBody>
-              <a:bodyPr lIns="0" tIns="0" rIns="0" bIns="0" rtlCol="0" anchor="ctr"/>
-              <a:lstStyle/>
-              <a:p>
-                <a:pPr algn="ctr"/>
-                <a:r>
-                  <a:rPr lang="en-GB" sz="3600" dirty="0" smtClean="0">
-                    <a:solidFill>
-                      <a:srgbClr val="660066"/>
-                    </a:solidFill>
-                  </a:rPr>
-                  <a:t>place</a:t>
-                </a:r>
-                <a:endParaRPr lang="en-GB" sz="3600" dirty="0">
-                  <a:solidFill>
-                    <a:srgbClr val="660066"/>
-                  </a:solidFill>
-                </a:endParaRPr>
-              </a:p>
-            </p:txBody>
-          </p:sp>
-          <p:sp>
-            <p:nvSpPr>
-              <p:cNvPr id="437" name="Rounded Rectangle 436"/>
-              <p:cNvSpPr/>
-              <p:nvPr/>
-            </p:nvSpPr>
-            <p:spPr>
-              <a:xfrm>
-                <a:off x="5904124" y="4066836"/>
-                <a:ext cx="1018225" cy="411909"/>
-              </a:xfrm>
-              <a:prstGeom prst="roundRect">
-                <a:avLst/>
-              </a:prstGeom>
-              <a:solidFill>
-                <a:srgbClr val="FFFFFF"/>
-              </a:solidFill>
-              <a:ln>
-                <a:solidFill>
-                  <a:srgbClr val="660066"/>
-                </a:solidFill>
-              </a:ln>
-              <a:effectLst/>
-            </p:spPr>
-            <p:style>
-              <a:lnRef idx="1">
-                <a:schemeClr val="accent1"/>
-              </a:lnRef>
-              <a:fillRef idx="3">
-                <a:schemeClr val="accent1"/>
-              </a:fillRef>
-              <a:effectRef idx="2">
-                <a:schemeClr val="accent1"/>
-              </a:effectRef>
-              <a:fontRef idx="minor">
-                <a:schemeClr val="lt1"/>
-              </a:fontRef>
-            </p:style>
-            <p:txBody>
-              <a:bodyPr lIns="0" tIns="0" rIns="0" bIns="0" rtlCol="0" anchor="ctr"/>
-              <a:lstStyle/>
-              <a:p>
-                <a:pPr algn="ctr"/>
-                <a:r>
-                  <a:rPr lang="en-GB" sz="3600" dirty="0" smtClean="0">
-                    <a:solidFill>
-                      <a:srgbClr val="660066"/>
-                    </a:solidFill>
-                  </a:rPr>
-                  <a:t>place</a:t>
-                </a:r>
-                <a:endParaRPr lang="en-GB" sz="3600" dirty="0">
-                  <a:solidFill>
-                    <a:srgbClr val="660066"/>
-                  </a:solidFill>
-                </a:endParaRPr>
-              </a:p>
-            </p:txBody>
-          </p:sp>
-          <p:sp>
-            <p:nvSpPr>
-              <p:cNvPr id="438" name="Rounded Rectangle 437"/>
-              <p:cNvSpPr/>
-              <p:nvPr/>
-            </p:nvSpPr>
-            <p:spPr>
-              <a:xfrm>
-                <a:off x="5904124" y="4696171"/>
-                <a:ext cx="1018225" cy="411909"/>
-              </a:xfrm>
-              <a:prstGeom prst="roundRect">
-                <a:avLst/>
-              </a:prstGeom>
-              <a:solidFill>
-                <a:srgbClr val="FFFFFF"/>
-              </a:solidFill>
-              <a:ln>
-                <a:solidFill>
-                  <a:srgbClr val="660066"/>
-                </a:solidFill>
-              </a:ln>
-              <a:effectLst/>
-            </p:spPr>
-            <p:style>
-              <a:lnRef idx="1">
-                <a:schemeClr val="accent1"/>
-              </a:lnRef>
-              <a:fillRef idx="3">
-                <a:schemeClr val="accent1"/>
-              </a:fillRef>
-              <a:effectRef idx="2">
-                <a:schemeClr val="accent1"/>
-              </a:effectRef>
-              <a:fontRef idx="minor">
-                <a:schemeClr val="lt1"/>
-              </a:fontRef>
-            </p:style>
-            <p:txBody>
-              <a:bodyPr lIns="0" tIns="0" rIns="0" bIns="0" rtlCol="0" anchor="ctr"/>
-              <a:lstStyle/>
-              <a:p>
-                <a:pPr algn="ctr"/>
-                <a:r>
-                  <a:rPr lang="en-GB" sz="3600" dirty="0" smtClean="0">
-                    <a:solidFill>
-                      <a:srgbClr val="660066"/>
-                    </a:solidFill>
-                  </a:rPr>
-                  <a:t>place</a:t>
-                </a:r>
-                <a:endParaRPr lang="en-GB" sz="3600" dirty="0">
-                  <a:solidFill>
-                    <a:srgbClr val="660066"/>
-                  </a:solidFill>
-                </a:endParaRPr>
-              </a:p>
-            </p:txBody>
-          </p:sp>
-          <p:sp>
-            <p:nvSpPr>
-              <p:cNvPr id="439" name="Rounded Rectangle 438"/>
-              <p:cNvSpPr/>
-              <p:nvPr/>
-            </p:nvSpPr>
-            <p:spPr>
-              <a:xfrm>
-                <a:off x="7554275" y="2833041"/>
-                <a:ext cx="1018225" cy="411909"/>
-              </a:xfrm>
-              <a:prstGeom prst="roundRect">
-                <a:avLst/>
-              </a:prstGeom>
-              <a:solidFill>
-                <a:srgbClr val="CCFFCC"/>
-              </a:solidFill>
-              <a:ln>
-                <a:solidFill>
-                  <a:srgbClr val="660066"/>
-                </a:solidFill>
-              </a:ln>
-              <a:effectLst/>
-            </p:spPr>
-            <p:style>
-              <a:lnRef idx="1">
-                <a:schemeClr val="accent1"/>
-              </a:lnRef>
-              <a:fillRef idx="3">
-                <a:schemeClr val="accent1"/>
-              </a:fillRef>
-              <a:effectRef idx="2">
-                <a:schemeClr val="accent1"/>
-              </a:effectRef>
-              <a:fontRef idx="minor">
-                <a:schemeClr val="lt1"/>
-              </a:fontRef>
-            </p:style>
-            <p:txBody>
-              <a:bodyPr lIns="0" tIns="0" rIns="0" bIns="0" rtlCol="0" anchor="ctr"/>
-              <a:lstStyle/>
-              <a:p>
-                <a:pPr algn="ctr"/>
-                <a:r>
-                  <a:rPr lang="en-GB" sz="3600" dirty="0" smtClean="0">
-                    <a:solidFill>
-                      <a:srgbClr val="660066"/>
-                    </a:solidFill>
-                  </a:rPr>
-                  <a:t>transition</a:t>
-                </a:r>
-                <a:endParaRPr lang="en-GB" sz="3600" dirty="0">
-                  <a:solidFill>
-                    <a:srgbClr val="660066"/>
-                  </a:solidFill>
-                </a:endParaRPr>
-              </a:p>
-            </p:txBody>
-          </p:sp>
-          <p:sp>
-            <p:nvSpPr>
-              <p:cNvPr id="440" name="Rounded Rectangle 439"/>
-              <p:cNvSpPr/>
-              <p:nvPr/>
-            </p:nvSpPr>
-            <p:spPr>
-              <a:xfrm>
-                <a:off x="7554275" y="3465050"/>
-                <a:ext cx="1018225" cy="411909"/>
-              </a:xfrm>
-              <a:prstGeom prst="roundRect">
-                <a:avLst/>
-              </a:prstGeom>
-              <a:solidFill>
-                <a:srgbClr val="FFFFFF"/>
-              </a:solidFill>
-              <a:ln>
-                <a:solidFill>
-                  <a:srgbClr val="660066"/>
-                </a:solidFill>
-              </a:ln>
-              <a:effectLst/>
-            </p:spPr>
-            <p:style>
-              <a:lnRef idx="1">
-                <a:schemeClr val="accent1"/>
-              </a:lnRef>
-              <a:fillRef idx="3">
-                <a:schemeClr val="accent1"/>
-              </a:fillRef>
-              <a:effectRef idx="2">
-                <a:schemeClr val="accent1"/>
-              </a:effectRef>
-              <a:fontRef idx="minor">
-                <a:schemeClr val="lt1"/>
-              </a:fontRef>
-            </p:style>
-            <p:txBody>
-              <a:bodyPr lIns="0" tIns="0" rIns="0" bIns="0" rtlCol="0" anchor="ctr"/>
-              <a:lstStyle/>
-              <a:p>
-                <a:pPr algn="ctr"/>
-                <a:r>
-                  <a:rPr lang="en-GB" sz="3600" dirty="0" smtClean="0">
-                    <a:solidFill>
-                      <a:srgbClr val="660066"/>
-                    </a:solidFill>
-                  </a:rPr>
-                  <a:t>transition</a:t>
-                </a:r>
-                <a:endParaRPr lang="en-GB" sz="3600" dirty="0">
-                  <a:solidFill>
-                    <a:srgbClr val="660066"/>
-                  </a:solidFill>
-                </a:endParaRPr>
-              </a:p>
-            </p:txBody>
-          </p:sp>
-          <p:sp>
-            <p:nvSpPr>
-              <p:cNvPr id="441" name="Rounded Rectangle 440"/>
-              <p:cNvSpPr/>
-              <p:nvPr/>
-            </p:nvSpPr>
-            <p:spPr>
-              <a:xfrm>
-                <a:off x="7554275" y="4066836"/>
-                <a:ext cx="1018225" cy="411909"/>
-              </a:xfrm>
-              <a:prstGeom prst="roundRect">
-                <a:avLst/>
-              </a:prstGeom>
-              <a:solidFill>
-                <a:srgbClr val="CCFFCC"/>
-              </a:solidFill>
-              <a:ln>
-                <a:solidFill>
-                  <a:srgbClr val="660066"/>
-                </a:solidFill>
-              </a:ln>
-              <a:effectLst/>
-            </p:spPr>
-            <p:style>
-              <a:lnRef idx="1">
-                <a:schemeClr val="accent1"/>
-              </a:lnRef>
-              <a:fillRef idx="3">
-                <a:schemeClr val="accent1"/>
-              </a:fillRef>
-              <a:effectRef idx="2">
-                <a:schemeClr val="accent1"/>
-              </a:effectRef>
-              <a:fontRef idx="minor">
-                <a:schemeClr val="lt1"/>
-              </a:fontRef>
-            </p:style>
-            <p:txBody>
-              <a:bodyPr lIns="0" tIns="0" rIns="0" bIns="0" rtlCol="0" anchor="ctr"/>
-              <a:lstStyle/>
-              <a:p>
-                <a:pPr algn="ctr"/>
-                <a:r>
-                  <a:rPr lang="en-GB" sz="3600" dirty="0" smtClean="0">
-                    <a:solidFill>
-                      <a:srgbClr val="660066"/>
-                    </a:solidFill>
-                  </a:rPr>
-                  <a:t>transition</a:t>
-                </a:r>
-                <a:endParaRPr lang="en-GB" sz="3600" dirty="0">
-                  <a:solidFill>
-                    <a:srgbClr val="660066"/>
-                  </a:solidFill>
-                </a:endParaRPr>
-              </a:p>
-            </p:txBody>
-          </p:sp>
-          <p:cxnSp>
-            <p:nvCxnSpPr>
-              <p:cNvPr id="442" name="Straight Connector 441"/>
-              <p:cNvCxnSpPr/>
-              <p:nvPr/>
-            </p:nvCxnSpPr>
-            <p:spPr>
-              <a:xfrm>
-                <a:off x="5572339" y="3029060"/>
-                <a:ext cx="331785" cy="0"/>
-              </a:xfrm>
-              <a:prstGeom prst="line">
-                <a:avLst/>
-              </a:prstGeom>
-              <a:ln>
-                <a:solidFill>
-                  <a:srgbClr val="660066"/>
-                </a:solidFill>
-              </a:ln>
-              <a:effectLst/>
-            </p:spPr>
-            <p:style>
-              <a:lnRef idx="2">
-                <a:schemeClr val="accent1"/>
-              </a:lnRef>
-              <a:fillRef idx="0">
-                <a:schemeClr val="accent1"/>
-              </a:fillRef>
-              <a:effectRef idx="1">
-                <a:schemeClr val="accent1"/>
-              </a:effectRef>
-              <a:fontRef idx="minor">
-                <a:schemeClr val="tx1"/>
-              </a:fontRef>
-            </p:style>
-          </p:cxnSp>
-          <p:cxnSp>
-            <p:nvCxnSpPr>
-              <p:cNvPr id="443" name="Straight Connector 442"/>
-              <p:cNvCxnSpPr/>
-              <p:nvPr/>
-            </p:nvCxnSpPr>
-            <p:spPr>
-              <a:xfrm>
-                <a:off x="5572339" y="4263340"/>
-                <a:ext cx="331785" cy="0"/>
-              </a:xfrm>
-              <a:prstGeom prst="line">
-                <a:avLst/>
-              </a:prstGeom>
-              <a:ln>
-                <a:solidFill>
-                  <a:srgbClr val="660066"/>
-                </a:solidFill>
-              </a:ln>
-              <a:effectLst/>
-            </p:spPr>
-            <p:style>
-              <a:lnRef idx="2">
-                <a:schemeClr val="accent1"/>
-              </a:lnRef>
-              <a:fillRef idx="0">
-                <a:schemeClr val="accent1"/>
-              </a:fillRef>
-              <a:effectRef idx="1">
-                <a:schemeClr val="accent1"/>
-              </a:effectRef>
-              <a:fontRef idx="minor">
-                <a:schemeClr val="tx1"/>
-              </a:fontRef>
-            </p:style>
-          </p:cxnSp>
-          <p:cxnSp>
-            <p:nvCxnSpPr>
-              <p:cNvPr id="444" name="Straight Connector 443"/>
-              <p:cNvCxnSpPr/>
-              <p:nvPr/>
-            </p:nvCxnSpPr>
-            <p:spPr>
-              <a:xfrm>
-                <a:off x="5572339" y="4873606"/>
-                <a:ext cx="331785" cy="0"/>
-              </a:xfrm>
-              <a:prstGeom prst="line">
-                <a:avLst/>
-              </a:prstGeom>
-              <a:ln>
-                <a:solidFill>
-                  <a:srgbClr val="660066"/>
-                </a:solidFill>
-              </a:ln>
-              <a:effectLst/>
-            </p:spPr>
-            <p:style>
-              <a:lnRef idx="2">
-                <a:schemeClr val="accent1"/>
-              </a:lnRef>
-              <a:fillRef idx="0">
-                <a:schemeClr val="accent1"/>
-              </a:fillRef>
-              <a:effectRef idx="1">
-                <a:schemeClr val="accent1"/>
-              </a:effectRef>
-              <a:fontRef idx="minor">
-                <a:schemeClr val="tx1"/>
-              </a:fontRef>
-            </p:style>
-          </p:cxnSp>
-          <p:cxnSp>
-            <p:nvCxnSpPr>
-              <p:cNvPr id="445" name="Straight Connector 444"/>
-              <p:cNvCxnSpPr/>
-              <p:nvPr/>
-            </p:nvCxnSpPr>
-            <p:spPr>
-              <a:xfrm>
-                <a:off x="7222490" y="3029060"/>
-                <a:ext cx="331785" cy="0"/>
-              </a:xfrm>
-              <a:prstGeom prst="line">
-                <a:avLst/>
-              </a:prstGeom>
-              <a:ln>
-                <a:solidFill>
-                  <a:srgbClr val="660066"/>
-                </a:solidFill>
-              </a:ln>
-              <a:effectLst/>
-            </p:spPr>
-            <p:style>
-              <a:lnRef idx="2">
-                <a:schemeClr val="accent1"/>
-              </a:lnRef>
-              <a:fillRef idx="0">
-                <a:schemeClr val="accent1"/>
-              </a:fillRef>
-              <a:effectRef idx="1">
-                <a:schemeClr val="accent1"/>
-              </a:effectRef>
-              <a:fontRef idx="minor">
-                <a:schemeClr val="tx1"/>
-              </a:fontRef>
-            </p:style>
-          </p:cxnSp>
-          <p:cxnSp>
-            <p:nvCxnSpPr>
-              <p:cNvPr id="446" name="Straight Connector 445"/>
-              <p:cNvCxnSpPr/>
-              <p:nvPr/>
-            </p:nvCxnSpPr>
-            <p:spPr>
-              <a:xfrm>
-                <a:off x="7222490" y="3680585"/>
-                <a:ext cx="331785" cy="0"/>
-              </a:xfrm>
-              <a:prstGeom prst="line">
-                <a:avLst/>
-              </a:prstGeom>
-              <a:ln>
-                <a:solidFill>
-                  <a:srgbClr val="660066"/>
-                </a:solidFill>
-              </a:ln>
-              <a:effectLst/>
-            </p:spPr>
-            <p:style>
-              <a:lnRef idx="2">
-                <a:schemeClr val="accent1"/>
-              </a:lnRef>
-              <a:fillRef idx="0">
-                <a:schemeClr val="accent1"/>
-              </a:fillRef>
-              <a:effectRef idx="1">
-                <a:schemeClr val="accent1"/>
-              </a:effectRef>
-              <a:fontRef idx="minor">
-                <a:schemeClr val="tx1"/>
-              </a:fontRef>
-            </p:style>
-          </p:cxnSp>
-          <p:cxnSp>
-            <p:nvCxnSpPr>
-              <p:cNvPr id="447" name="Straight Connector 446"/>
-              <p:cNvCxnSpPr/>
-              <p:nvPr/>
-            </p:nvCxnSpPr>
-            <p:spPr>
-              <a:xfrm>
-                <a:off x="7222490" y="4266460"/>
-                <a:ext cx="331785" cy="0"/>
-              </a:xfrm>
-              <a:prstGeom prst="line">
-                <a:avLst/>
-              </a:prstGeom>
-              <a:ln>
-                <a:solidFill>
-                  <a:srgbClr val="660066"/>
-                </a:solidFill>
-              </a:ln>
-              <a:effectLst/>
-            </p:spPr>
-            <p:style>
-              <a:lnRef idx="2">
-                <a:schemeClr val="accent1"/>
-              </a:lnRef>
-              <a:fillRef idx="0">
-                <a:schemeClr val="accent1"/>
-              </a:fillRef>
-              <a:effectRef idx="1">
-                <a:schemeClr val="accent1"/>
-              </a:effectRef>
-              <a:fontRef idx="minor">
-                <a:schemeClr val="tx1"/>
-              </a:fontRef>
-            </p:style>
-          </p:cxnSp>
-          <p:cxnSp>
-            <p:nvCxnSpPr>
-              <p:cNvPr id="448" name="Straight Connector 447"/>
-              <p:cNvCxnSpPr/>
-              <p:nvPr/>
-            </p:nvCxnSpPr>
-            <p:spPr>
-              <a:xfrm flipV="1">
-                <a:off x="5572339" y="2565747"/>
-                <a:ext cx="0" cy="2307859"/>
-              </a:xfrm>
-              <a:prstGeom prst="line">
-                <a:avLst/>
-              </a:prstGeom>
-              <a:ln>
-                <a:solidFill>
-                  <a:srgbClr val="660066"/>
-                </a:solidFill>
-              </a:ln>
-              <a:effectLst/>
-            </p:spPr>
-            <p:style>
-              <a:lnRef idx="2">
-                <a:schemeClr val="accent1"/>
-              </a:lnRef>
-              <a:fillRef idx="0">
-                <a:schemeClr val="accent1"/>
-              </a:fillRef>
-              <a:effectRef idx="1">
-                <a:schemeClr val="accent1"/>
-              </a:effectRef>
-              <a:fontRef idx="minor">
-                <a:schemeClr val="tx1"/>
-              </a:fontRef>
-            </p:style>
-          </p:cxnSp>
-          <p:cxnSp>
-            <p:nvCxnSpPr>
-              <p:cNvPr id="449" name="Straight Connector 448"/>
-              <p:cNvCxnSpPr/>
-              <p:nvPr/>
-            </p:nvCxnSpPr>
-            <p:spPr>
-              <a:xfrm flipH="1" flipV="1">
-                <a:off x="7222490" y="2565746"/>
-                <a:ext cx="1" cy="1697595"/>
-              </a:xfrm>
-              <a:prstGeom prst="line">
-                <a:avLst/>
-              </a:prstGeom>
-              <a:ln>
-                <a:solidFill>
-                  <a:srgbClr val="660066"/>
-                </a:solidFill>
-              </a:ln>
-              <a:effectLst/>
-            </p:spPr>
-            <p:style>
-              <a:lnRef idx="2">
-                <a:schemeClr val="accent1"/>
-              </a:lnRef>
-              <a:fillRef idx="0">
-                <a:schemeClr val="accent1"/>
-              </a:fillRef>
-              <a:effectRef idx="1">
-                <a:schemeClr val="accent1"/>
-              </a:effectRef>
-              <a:fontRef idx="minor">
-                <a:schemeClr val="tx1"/>
-              </a:fontRef>
-            </p:style>
-          </p:cxnSp>
-          <p:cxnSp>
-            <p:nvCxnSpPr>
-              <p:cNvPr id="450" name="Straight Connector 449"/>
-              <p:cNvCxnSpPr/>
-              <p:nvPr/>
-            </p:nvCxnSpPr>
-            <p:spPr>
-              <a:xfrm flipH="1">
-                <a:off x="5572339" y="2565747"/>
-                <a:ext cx="1650152" cy="0"/>
-              </a:xfrm>
-              <a:prstGeom prst="line">
-                <a:avLst/>
-              </a:prstGeom>
-              <a:ln>
-                <a:solidFill>
-                  <a:srgbClr val="660066"/>
-                </a:solidFill>
-              </a:ln>
-              <a:effectLst/>
-            </p:spPr>
-            <p:style>
-              <a:lnRef idx="2">
-                <a:schemeClr val="accent1"/>
-              </a:lnRef>
-              <a:fillRef idx="0">
-                <a:schemeClr val="accent1"/>
-              </a:fillRef>
-              <a:effectRef idx="1">
-                <a:schemeClr val="accent1"/>
-              </a:effectRef>
-              <a:fontRef idx="minor">
-                <a:schemeClr val="tx1"/>
-              </a:fontRef>
-            </p:style>
-          </p:cxnSp>
-          <p:cxnSp>
-            <p:nvCxnSpPr>
-              <p:cNvPr id="451" name="Straight Connector 450"/>
-              <p:cNvCxnSpPr>
-                <a:endCxn id="435" idx="2"/>
-              </p:cNvCxnSpPr>
-              <p:nvPr/>
-            </p:nvCxnSpPr>
-            <p:spPr>
-              <a:xfrm flipV="1">
-                <a:off x="6400800" y="2249502"/>
-                <a:ext cx="30" cy="316244"/>
-              </a:xfrm>
-              <a:prstGeom prst="line">
-                <a:avLst/>
-              </a:prstGeom>
-              <a:ln>
-                <a:solidFill>
-                  <a:srgbClr val="660066"/>
-                </a:solidFill>
-              </a:ln>
-              <a:effectLst/>
-            </p:spPr>
-            <p:style>
-              <a:lnRef idx="2">
-                <a:schemeClr val="accent1"/>
-              </a:lnRef>
-              <a:fillRef idx="0">
-                <a:schemeClr val="accent1"/>
-              </a:fillRef>
-              <a:effectRef idx="1">
-                <a:schemeClr val="accent1"/>
-              </a:effectRef>
-              <a:fontRef idx="minor">
-                <a:schemeClr val="tx1"/>
-              </a:fontRef>
-            </p:style>
-          </p:cxnSp>
-          <p:cxnSp>
-            <p:nvCxnSpPr>
-              <p:cNvPr id="452" name="Straight Connector 451"/>
-              <p:cNvCxnSpPr/>
-              <p:nvPr/>
-            </p:nvCxnSpPr>
-            <p:spPr>
-              <a:xfrm flipH="1">
-                <a:off x="4776049" y="2833041"/>
-                <a:ext cx="1128075" cy="0"/>
-              </a:xfrm>
-              <a:prstGeom prst="line">
-                <a:avLst/>
-              </a:prstGeom>
-              <a:ln>
-                <a:solidFill>
-                  <a:srgbClr val="3366FF"/>
-                </a:solidFill>
-                <a:headEnd type="triangle" w="lg" len="lg"/>
-                <a:tailEnd type="none"/>
-              </a:ln>
-              <a:effectLst/>
-            </p:spPr>
-            <p:style>
-              <a:lnRef idx="2">
-                <a:schemeClr val="accent1"/>
-              </a:lnRef>
-              <a:fillRef idx="0">
-                <a:schemeClr val="accent1"/>
-              </a:fillRef>
-              <a:effectRef idx="1">
-                <a:schemeClr val="accent1"/>
-              </a:effectRef>
-              <a:fontRef idx="minor">
-                <a:schemeClr val="tx1"/>
-              </a:fontRef>
-            </p:style>
-          </p:cxnSp>
-          <p:cxnSp>
-            <p:nvCxnSpPr>
-              <p:cNvPr id="453" name="Straight Connector 452"/>
-              <p:cNvCxnSpPr/>
-              <p:nvPr/>
-            </p:nvCxnSpPr>
-            <p:spPr>
-              <a:xfrm flipH="1" flipV="1">
-                <a:off x="4776049" y="4053195"/>
-                <a:ext cx="1128075" cy="13641"/>
-              </a:xfrm>
-              <a:prstGeom prst="line">
-                <a:avLst/>
-              </a:prstGeom>
-              <a:ln>
-                <a:solidFill>
-                  <a:srgbClr val="3366FF"/>
-                </a:solidFill>
-                <a:headEnd type="triangle" w="lg" len="lg"/>
-                <a:tailEnd type="none"/>
-              </a:ln>
-              <a:effectLst/>
-            </p:spPr>
-            <p:style>
-              <a:lnRef idx="2">
-                <a:schemeClr val="accent1"/>
-              </a:lnRef>
-              <a:fillRef idx="0">
-                <a:schemeClr val="accent1"/>
-              </a:fillRef>
-              <a:effectRef idx="1">
-                <a:schemeClr val="accent1"/>
-              </a:effectRef>
-              <a:fontRef idx="minor">
-                <a:schemeClr val="tx1"/>
-              </a:fontRef>
-            </p:style>
-          </p:cxnSp>
-          <p:cxnSp>
-            <p:nvCxnSpPr>
-              <p:cNvPr id="454" name="Straight Connector 453"/>
-              <p:cNvCxnSpPr/>
-              <p:nvPr/>
-            </p:nvCxnSpPr>
-            <p:spPr>
-              <a:xfrm flipH="1">
-                <a:off x="4776049" y="4696751"/>
-                <a:ext cx="1128075" cy="0"/>
-              </a:xfrm>
-              <a:prstGeom prst="line">
-                <a:avLst/>
-              </a:prstGeom>
-              <a:ln>
-                <a:solidFill>
-                  <a:srgbClr val="3366FF"/>
-                </a:solidFill>
-                <a:headEnd type="triangle" w="lg" len="lg"/>
-                <a:tailEnd type="none"/>
-              </a:ln>
-              <a:effectLst/>
-            </p:spPr>
-            <p:style>
-              <a:lnRef idx="2">
-                <a:schemeClr val="accent1"/>
-              </a:lnRef>
-              <a:fillRef idx="0">
-                <a:schemeClr val="accent1"/>
-              </a:fillRef>
-              <a:effectRef idx="1">
-                <a:schemeClr val="accent1"/>
-              </a:effectRef>
-              <a:fontRef idx="minor">
-                <a:schemeClr val="tx1"/>
-              </a:fontRef>
-            </p:style>
-          </p:cxnSp>
-          <p:sp>
-            <p:nvSpPr>
-              <p:cNvPr id="455" name="TextBox 454"/>
-              <p:cNvSpPr txBox="1"/>
-              <p:nvPr/>
-            </p:nvSpPr>
-            <p:spPr>
-              <a:xfrm>
-                <a:off x="4728467" y="2738654"/>
-                <a:ext cx="641800" cy="323166"/>
-              </a:xfrm>
-              <a:prstGeom prst="rect">
-                <a:avLst/>
-              </a:prstGeom>
-              <a:noFill/>
-            </p:spPr>
-            <p:txBody>
-              <a:bodyPr wrap="none" rtlCol="0">
-                <a:spAutoFit/>
-              </a:bodyPr>
-              <a:lstStyle/>
-              <a:p>
-                <a:r>
-                  <a:rPr lang="en-GB" sz="3600" dirty="0" smtClean="0">
-                    <a:solidFill>
-                      <a:srgbClr val="3366FF"/>
-                    </a:solidFill>
-                  </a:rPr>
-                  <a:t> place</a:t>
-                </a:r>
-              </a:p>
-            </p:txBody>
-          </p:sp>
-          <p:cxnSp>
-            <p:nvCxnSpPr>
-              <p:cNvPr id="456" name="Straight Connector 455"/>
-              <p:cNvCxnSpPr>
-                <a:stCxn id="435" idx="1"/>
-                <a:endCxn id="401" idx="3"/>
-              </p:cNvCxnSpPr>
-              <p:nvPr/>
-            </p:nvCxnSpPr>
-            <p:spPr>
-              <a:xfrm flipH="1">
-                <a:off x="2428640" y="2020664"/>
-                <a:ext cx="3440196" cy="0"/>
-              </a:xfrm>
-              <a:prstGeom prst="line">
-                <a:avLst/>
-              </a:prstGeom>
-              <a:ln>
-                <a:solidFill>
-                  <a:srgbClr val="3366FF"/>
-                </a:solidFill>
-                <a:headEnd type="triangle" w="lg" len="lg"/>
-                <a:tailEnd type="none"/>
-              </a:ln>
-              <a:effectLst/>
-            </p:spPr>
-            <p:style>
-              <a:lnRef idx="2">
-                <a:schemeClr val="accent1"/>
-              </a:lnRef>
-              <a:fillRef idx="0">
-                <a:schemeClr val="accent1"/>
-              </a:fillRef>
-              <a:effectRef idx="1">
-                <a:schemeClr val="accent1"/>
-              </a:effectRef>
-              <a:fontRef idx="minor">
-                <a:schemeClr val="tx1"/>
-              </a:fontRef>
-            </p:style>
-          </p:cxnSp>
-          <p:sp>
-            <p:nvSpPr>
-              <p:cNvPr id="457" name="TextBox 456"/>
-              <p:cNvSpPr txBox="1"/>
-              <p:nvPr/>
-            </p:nvSpPr>
-            <p:spPr>
-              <a:xfrm>
-                <a:off x="2381944" y="1657959"/>
-                <a:ext cx="904868" cy="323166"/>
-              </a:xfrm>
-              <a:prstGeom prst="rect">
-                <a:avLst/>
-              </a:prstGeom>
-              <a:noFill/>
-            </p:spPr>
-            <p:txBody>
-              <a:bodyPr wrap="none" rtlCol="0">
-                <a:spAutoFit/>
-              </a:bodyPr>
-              <a:lstStyle/>
-              <a:p>
-                <a:r>
-                  <a:rPr lang="en-GB" sz="3600" dirty="0" smtClean="0">
-                    <a:solidFill>
-                      <a:srgbClr val="3366FF"/>
-                    </a:solidFill>
-                  </a:rPr>
-                  <a:t> </a:t>
-                </a:r>
-                <a:r>
-                  <a:rPr lang="en-GB" sz="3600" dirty="0" err="1" smtClean="0">
-                    <a:solidFill>
-                      <a:srgbClr val="3366FF"/>
-                    </a:solidFill>
-                  </a:rPr>
-                  <a:t>petrinet</a:t>
-                </a:r>
-                <a:endParaRPr lang="en-GB" sz="3600" dirty="0" smtClean="0">
-                  <a:solidFill>
-                    <a:srgbClr val="3366FF"/>
-                  </a:solidFill>
-                </a:endParaRPr>
-              </a:p>
-            </p:txBody>
-          </p:sp>
-          <p:sp>
-            <p:nvSpPr>
-              <p:cNvPr id="458" name="Rounded Rectangle 457"/>
-              <p:cNvSpPr/>
-              <p:nvPr/>
-            </p:nvSpPr>
-            <p:spPr>
-              <a:xfrm>
-                <a:off x="6243261" y="5281610"/>
-                <a:ext cx="679088" cy="303850"/>
-              </a:xfrm>
-              <a:prstGeom prst="roundRect">
-                <a:avLst/>
-              </a:prstGeom>
-              <a:solidFill>
-                <a:srgbClr val="FFFFFF"/>
-              </a:solidFill>
-              <a:ln>
-                <a:solidFill>
-                  <a:srgbClr val="660066"/>
-                </a:solidFill>
-              </a:ln>
-              <a:effectLst/>
-            </p:spPr>
-            <p:style>
-              <a:lnRef idx="1">
-                <a:schemeClr val="accent1"/>
-              </a:lnRef>
-              <a:fillRef idx="3">
-                <a:schemeClr val="accent1"/>
-              </a:fillRef>
-              <a:effectRef idx="2">
-                <a:schemeClr val="accent1"/>
-              </a:effectRef>
-              <a:fontRef idx="minor">
-                <a:schemeClr val="lt1"/>
-              </a:fontRef>
-            </p:style>
-            <p:txBody>
-              <a:bodyPr lIns="0" tIns="0" rIns="0" bIns="0" rtlCol="0" anchor="ctr"/>
-              <a:lstStyle/>
-              <a:p>
-                <a:pPr algn="ctr"/>
-                <a:r>
-                  <a:rPr lang="en-GB" sz="3600" dirty="0" smtClean="0">
-                    <a:solidFill>
-                      <a:srgbClr val="660066"/>
-                    </a:solidFill>
-                  </a:rPr>
-                  <a:t>token</a:t>
-                </a:r>
-                <a:endParaRPr lang="en-GB" sz="3600" dirty="0">
-                  <a:solidFill>
-                    <a:srgbClr val="660066"/>
-                  </a:solidFill>
-                </a:endParaRPr>
-              </a:p>
-            </p:txBody>
-          </p:sp>
-          <p:cxnSp>
-            <p:nvCxnSpPr>
-              <p:cNvPr id="459" name="Straight Connector 458"/>
-              <p:cNvCxnSpPr/>
-              <p:nvPr/>
-            </p:nvCxnSpPr>
-            <p:spPr>
-              <a:xfrm flipV="1">
-                <a:off x="6106372" y="5108081"/>
-                <a:ext cx="0" cy="325454"/>
-              </a:xfrm>
-              <a:prstGeom prst="line">
-                <a:avLst/>
-              </a:prstGeom>
-              <a:ln>
-                <a:solidFill>
-                  <a:srgbClr val="660066"/>
-                </a:solidFill>
-              </a:ln>
-              <a:effectLst/>
-            </p:spPr>
-            <p:style>
-              <a:lnRef idx="2">
-                <a:schemeClr val="accent1"/>
-              </a:lnRef>
-              <a:fillRef idx="0">
-                <a:schemeClr val="accent1"/>
-              </a:fillRef>
-              <a:effectRef idx="1">
-                <a:schemeClr val="accent1"/>
-              </a:effectRef>
-              <a:fontRef idx="minor">
-                <a:schemeClr val="tx1"/>
-              </a:fontRef>
-            </p:style>
-          </p:cxnSp>
-          <p:cxnSp>
-            <p:nvCxnSpPr>
-              <p:cNvPr id="460" name="Straight Connector 459"/>
-              <p:cNvCxnSpPr/>
-              <p:nvPr/>
-            </p:nvCxnSpPr>
-            <p:spPr>
-              <a:xfrm>
-                <a:off x="6106372" y="5433535"/>
-                <a:ext cx="136889" cy="0"/>
-              </a:xfrm>
-              <a:prstGeom prst="line">
-                <a:avLst/>
-              </a:prstGeom>
-              <a:ln>
-                <a:solidFill>
-                  <a:srgbClr val="660066"/>
-                </a:solidFill>
-              </a:ln>
-              <a:effectLst/>
-            </p:spPr>
-            <p:style>
-              <a:lnRef idx="2">
-                <a:schemeClr val="accent1"/>
-              </a:lnRef>
-              <a:fillRef idx="0">
-                <a:schemeClr val="accent1"/>
-              </a:fillRef>
-              <a:effectRef idx="1">
-                <a:schemeClr val="accent1"/>
-              </a:effectRef>
-              <a:fontRef idx="minor">
-                <a:schemeClr val="tx1"/>
-              </a:fontRef>
-            </p:style>
-          </p:cxnSp>
-          <p:cxnSp>
-            <p:nvCxnSpPr>
-              <p:cNvPr id="461" name="Straight Connector 460"/>
-              <p:cNvCxnSpPr>
-                <a:stCxn id="458" idx="3"/>
-              </p:cNvCxnSpPr>
-              <p:nvPr/>
-            </p:nvCxnSpPr>
-            <p:spPr>
-              <a:xfrm>
-                <a:off x="6922349" y="5433535"/>
-                <a:ext cx="1967651" cy="0"/>
-              </a:xfrm>
-              <a:prstGeom prst="line">
-                <a:avLst/>
-              </a:prstGeom>
-              <a:ln>
-                <a:solidFill>
-                  <a:srgbClr val="008000"/>
-                </a:solidFill>
-                <a:headEnd type="triangle" w="lg" len="lg"/>
-                <a:tailEnd type="none"/>
-              </a:ln>
-              <a:effectLst/>
-            </p:spPr>
-            <p:style>
-              <a:lnRef idx="2">
-                <a:schemeClr val="accent1"/>
-              </a:lnRef>
-              <a:fillRef idx="0">
-                <a:schemeClr val="accent1"/>
-              </a:fillRef>
-              <a:effectRef idx="1">
-                <a:schemeClr val="accent1"/>
-              </a:effectRef>
-              <a:fontRef idx="minor">
-                <a:schemeClr val="tx1"/>
-              </a:fontRef>
-            </p:style>
-          </p:cxnSp>
-          <p:cxnSp>
-            <p:nvCxnSpPr>
-              <p:cNvPr id="462" name="Straight Connector 461"/>
-              <p:cNvCxnSpPr/>
-              <p:nvPr/>
-            </p:nvCxnSpPr>
-            <p:spPr>
-              <a:xfrm>
-                <a:off x="8890000" y="3029060"/>
-                <a:ext cx="0" cy="2404475"/>
-              </a:xfrm>
-              <a:prstGeom prst="line">
-                <a:avLst/>
-              </a:prstGeom>
-              <a:ln>
-                <a:solidFill>
-                  <a:srgbClr val="008000"/>
-                </a:solidFill>
-              </a:ln>
-              <a:effectLst/>
-            </p:spPr>
-            <p:style>
-              <a:lnRef idx="2">
-                <a:schemeClr val="accent1"/>
-              </a:lnRef>
-              <a:fillRef idx="0">
-                <a:schemeClr val="accent1"/>
-              </a:fillRef>
-              <a:effectRef idx="1">
-                <a:schemeClr val="accent1"/>
-              </a:effectRef>
-              <a:fontRef idx="minor">
-                <a:schemeClr val="tx1"/>
-              </a:fontRef>
-            </p:style>
-          </p:cxnSp>
-          <p:cxnSp>
-            <p:nvCxnSpPr>
-              <p:cNvPr id="463" name="Straight Connector 462"/>
-              <p:cNvCxnSpPr>
-                <a:stCxn id="439" idx="3"/>
-              </p:cNvCxnSpPr>
-              <p:nvPr/>
-            </p:nvCxnSpPr>
-            <p:spPr>
-              <a:xfrm>
-                <a:off x="8572500" y="3038996"/>
-                <a:ext cx="317500" cy="0"/>
-              </a:xfrm>
-              <a:prstGeom prst="line">
-                <a:avLst/>
-              </a:prstGeom>
-              <a:ln>
-                <a:solidFill>
-                  <a:srgbClr val="008000"/>
-                </a:solidFill>
-              </a:ln>
-              <a:effectLst/>
-            </p:spPr>
-            <p:style>
-              <a:lnRef idx="2">
-                <a:schemeClr val="accent1"/>
-              </a:lnRef>
-              <a:fillRef idx="0">
-                <a:schemeClr val="accent1"/>
-              </a:fillRef>
-              <a:effectRef idx="1">
-                <a:schemeClr val="accent1"/>
-              </a:effectRef>
-              <a:fontRef idx="minor">
-                <a:schemeClr val="tx1"/>
-              </a:fontRef>
-            </p:style>
-          </p:cxnSp>
-          <p:cxnSp>
-            <p:nvCxnSpPr>
-              <p:cNvPr id="464" name="Straight Connector 463"/>
-              <p:cNvCxnSpPr>
-                <a:stCxn id="441" idx="3"/>
-              </p:cNvCxnSpPr>
-              <p:nvPr/>
-            </p:nvCxnSpPr>
-            <p:spPr>
-              <a:xfrm flipV="1">
-                <a:off x="8572500" y="4266460"/>
-                <a:ext cx="317500" cy="6331"/>
-              </a:xfrm>
-              <a:prstGeom prst="line">
-                <a:avLst/>
-              </a:prstGeom>
-              <a:ln>
-                <a:solidFill>
-                  <a:srgbClr val="008000"/>
-                </a:solidFill>
-              </a:ln>
-              <a:effectLst/>
-            </p:spPr>
-            <p:style>
-              <a:lnRef idx="2">
-                <a:schemeClr val="accent1"/>
-              </a:lnRef>
-              <a:fillRef idx="0">
-                <a:schemeClr val="accent1"/>
-              </a:fillRef>
-              <a:effectRef idx="1">
-                <a:schemeClr val="accent1"/>
-              </a:effectRef>
-              <a:fontRef idx="minor">
-                <a:schemeClr val="tx1"/>
-              </a:fontRef>
-            </p:style>
-          </p:cxnSp>
-          <p:sp>
-            <p:nvSpPr>
-              <p:cNvPr id="465" name="Rounded Rectangle 464"/>
-              <p:cNvSpPr/>
-              <p:nvPr/>
-            </p:nvSpPr>
-            <p:spPr>
-              <a:xfrm>
-                <a:off x="7893412" y="4674714"/>
-                <a:ext cx="679088" cy="303850"/>
-              </a:xfrm>
-              <a:prstGeom prst="roundRect">
-                <a:avLst/>
-              </a:prstGeom>
-              <a:solidFill>
-                <a:srgbClr val="FFFFFF"/>
-              </a:solidFill>
-              <a:ln>
-                <a:solidFill>
-                  <a:srgbClr val="660066"/>
-                </a:solidFill>
-              </a:ln>
-              <a:effectLst/>
-            </p:spPr>
-            <p:style>
-              <a:lnRef idx="1">
-                <a:schemeClr val="accent1"/>
-              </a:lnRef>
-              <a:fillRef idx="3">
-                <a:schemeClr val="accent1"/>
-              </a:fillRef>
-              <a:effectRef idx="2">
-                <a:schemeClr val="accent1"/>
-              </a:effectRef>
-              <a:fontRef idx="minor">
-                <a:schemeClr val="lt1"/>
-              </a:fontRef>
-            </p:style>
-            <p:txBody>
-              <a:bodyPr lIns="0" tIns="0" rIns="0" bIns="0" rtlCol="0" anchor="ctr"/>
-              <a:lstStyle/>
-              <a:p>
-                <a:pPr algn="ctr"/>
-                <a:r>
-                  <a:rPr lang="en-GB" sz="3600" dirty="0" smtClean="0">
-                    <a:solidFill>
-                      <a:srgbClr val="660066"/>
-                    </a:solidFill>
-                  </a:rPr>
-                  <a:t>arcs</a:t>
-                </a:r>
-                <a:endParaRPr lang="en-GB" sz="3600" dirty="0">
-                  <a:solidFill>
-                    <a:srgbClr val="660066"/>
-                  </a:solidFill>
-                </a:endParaRPr>
-              </a:p>
-            </p:txBody>
-          </p:sp>
-          <p:sp>
-            <p:nvSpPr>
-              <p:cNvPr id="466" name="Isosceles Triangle 465"/>
-              <p:cNvSpPr/>
-              <p:nvPr/>
-            </p:nvSpPr>
-            <p:spPr>
-              <a:xfrm>
-                <a:off x="7893412" y="4995965"/>
-                <a:ext cx="679088" cy="181316"/>
-              </a:xfrm>
-              <a:prstGeom prst="triangle">
-                <a:avLst/>
-              </a:prstGeom>
-              <a:noFill/>
-              <a:ln>
-                <a:solidFill>
-                  <a:srgbClr val="660066"/>
-                </a:solidFill>
-              </a:ln>
-            </p:spPr>
-            <p:style>
-              <a:lnRef idx="1">
-                <a:schemeClr val="accent1"/>
-              </a:lnRef>
-              <a:fillRef idx="3">
-                <a:schemeClr val="accent1"/>
-              </a:fillRef>
-              <a:effectRef idx="2">
-                <a:schemeClr val="accent1"/>
-              </a:effectRef>
-              <a:fontRef idx="minor">
-                <a:schemeClr val="lt1"/>
-              </a:fontRef>
-            </p:style>
-            <p:txBody>
-              <a:bodyPr rtlCol="0" anchor="ctr"/>
-              <a:lstStyle/>
-              <a:p>
-                <a:pPr algn="ctr"/>
-                <a:endParaRPr lang="en-GB" sz="3600">
-                  <a:solidFill>
-                    <a:srgbClr val="660066"/>
-                  </a:solidFill>
-                </a:endParaRPr>
-              </a:p>
-            </p:txBody>
-          </p:sp>
-          <p:cxnSp>
-            <p:nvCxnSpPr>
-              <p:cNvPr id="467" name="Straight Connector 466"/>
-              <p:cNvCxnSpPr/>
-              <p:nvPr/>
-            </p:nvCxnSpPr>
-            <p:spPr>
-              <a:xfrm>
-                <a:off x="7756523" y="4814410"/>
-                <a:ext cx="136889" cy="0"/>
-              </a:xfrm>
-              <a:prstGeom prst="line">
-                <a:avLst/>
-              </a:prstGeom>
-              <a:ln>
-                <a:solidFill>
-                  <a:srgbClr val="660066"/>
-                </a:solidFill>
-              </a:ln>
-              <a:effectLst/>
-            </p:spPr>
-            <p:style>
-              <a:lnRef idx="2">
-                <a:schemeClr val="accent1"/>
-              </a:lnRef>
-              <a:fillRef idx="0">
-                <a:schemeClr val="accent1"/>
-              </a:fillRef>
-              <a:effectRef idx="1">
-                <a:schemeClr val="accent1"/>
-              </a:effectRef>
-              <a:fontRef idx="minor">
-                <a:schemeClr val="tx1"/>
-              </a:fontRef>
-            </p:style>
-          </p:cxnSp>
-          <p:cxnSp>
-            <p:nvCxnSpPr>
-              <p:cNvPr id="468" name="Straight Connector 467"/>
-              <p:cNvCxnSpPr/>
-              <p:nvPr/>
-            </p:nvCxnSpPr>
-            <p:spPr>
-              <a:xfrm flipV="1">
-                <a:off x="7756523" y="4478745"/>
-                <a:ext cx="0" cy="335667"/>
-              </a:xfrm>
-              <a:prstGeom prst="line">
-                <a:avLst/>
-              </a:prstGeom>
-              <a:ln>
-                <a:solidFill>
-                  <a:srgbClr val="660066"/>
-                </a:solidFill>
-              </a:ln>
-              <a:effectLst/>
-            </p:spPr>
-            <p:style>
-              <a:lnRef idx="2">
-                <a:schemeClr val="accent1"/>
-              </a:lnRef>
-              <a:fillRef idx="0">
-                <a:schemeClr val="accent1"/>
-              </a:fillRef>
-              <a:effectRef idx="1">
-                <a:schemeClr val="accent1"/>
-              </a:effectRef>
-              <a:fontRef idx="minor">
-                <a:schemeClr val="tx1"/>
-              </a:fontRef>
-            </p:style>
-          </p:cxnSp>
-          <p:cxnSp>
-            <p:nvCxnSpPr>
-              <p:cNvPr id="469" name="Straight Connector 468"/>
-              <p:cNvCxnSpPr>
-                <a:stCxn id="438" idx="3"/>
-                <a:endCxn id="466" idx="2"/>
-              </p:cNvCxnSpPr>
-              <p:nvPr/>
-            </p:nvCxnSpPr>
-            <p:spPr>
-              <a:xfrm>
-                <a:off x="6922349" y="4902126"/>
-                <a:ext cx="971063" cy="275155"/>
-              </a:xfrm>
-              <a:prstGeom prst="line">
-                <a:avLst/>
-              </a:prstGeom>
-              <a:ln>
-                <a:solidFill>
-                  <a:srgbClr val="FF0000"/>
-                </a:solidFill>
-                <a:headEnd type="triangle" w="lg" len="lg"/>
-                <a:tailEnd type="none"/>
-              </a:ln>
-              <a:effectLst/>
-            </p:spPr>
-            <p:style>
-              <a:lnRef idx="2">
-                <a:schemeClr val="accent1"/>
-              </a:lnRef>
-              <a:fillRef idx="0">
-                <a:schemeClr val="accent1"/>
-              </a:fillRef>
-              <a:effectRef idx="1">
-                <a:schemeClr val="accent1"/>
-              </a:effectRef>
-              <a:fontRef idx="minor">
-                <a:schemeClr val="tx1"/>
-              </a:fontRef>
-            </p:style>
-          </p:cxnSp>
-          <p:cxnSp>
-            <p:nvCxnSpPr>
-              <p:cNvPr id="470" name="Straight Connector 469"/>
-              <p:cNvCxnSpPr/>
-              <p:nvPr/>
-            </p:nvCxnSpPr>
-            <p:spPr>
-              <a:xfrm>
-                <a:off x="6922349" y="3244950"/>
-                <a:ext cx="157901" cy="1552202"/>
-              </a:xfrm>
-              <a:prstGeom prst="line">
-                <a:avLst/>
-              </a:prstGeom>
-              <a:ln>
-                <a:solidFill>
-                  <a:srgbClr val="FF0000"/>
-                </a:solidFill>
-                <a:headEnd type="triangle" w="lg" len="lg"/>
-                <a:tailEnd type="none"/>
-              </a:ln>
-              <a:effectLst/>
-            </p:spPr>
-            <p:style>
-              <a:lnRef idx="2">
-                <a:schemeClr val="accent1"/>
-              </a:lnRef>
-              <a:fillRef idx="0">
-                <a:schemeClr val="accent1"/>
-              </a:fillRef>
-              <a:effectRef idx="1">
-                <a:schemeClr val="accent1"/>
-              </a:effectRef>
-              <a:fontRef idx="minor">
-                <a:schemeClr val="tx1"/>
-              </a:fontRef>
-            </p:style>
-          </p:cxnSp>
-          <p:cxnSp>
-            <p:nvCxnSpPr>
-              <p:cNvPr id="471" name="Straight Connector 470"/>
-              <p:cNvCxnSpPr>
-                <a:endCxn id="466" idx="1"/>
-              </p:cNvCxnSpPr>
-              <p:nvPr/>
-            </p:nvCxnSpPr>
-            <p:spPr>
-              <a:xfrm>
-                <a:off x="7080250" y="4797152"/>
-                <a:ext cx="982934" cy="289471"/>
-              </a:xfrm>
-              <a:prstGeom prst="line">
-                <a:avLst/>
-              </a:prstGeom>
-              <a:ln>
-                <a:solidFill>
-                  <a:srgbClr val="FF0000"/>
-                </a:solidFill>
-              </a:ln>
-              <a:effectLst/>
-            </p:spPr>
-            <p:style>
-              <a:lnRef idx="2">
-                <a:schemeClr val="accent1"/>
-              </a:lnRef>
-              <a:fillRef idx="0">
-                <a:schemeClr val="accent1"/>
-              </a:fillRef>
-              <a:effectRef idx="1">
-                <a:schemeClr val="accent1"/>
-              </a:effectRef>
-              <a:fontRef idx="minor">
-                <a:schemeClr val="tx1"/>
-              </a:fontRef>
-            </p:style>
-          </p:cxnSp>
-          <p:sp>
-            <p:nvSpPr>
-              <p:cNvPr id="472" name="TextBox 471"/>
-              <p:cNvSpPr txBox="1"/>
-              <p:nvPr/>
-            </p:nvSpPr>
-            <p:spPr>
-              <a:xfrm>
-                <a:off x="8025956" y="5384306"/>
-                <a:ext cx="849414" cy="323166"/>
-              </a:xfrm>
-              <a:prstGeom prst="rect">
-                <a:avLst/>
-              </a:prstGeom>
-              <a:noFill/>
-            </p:spPr>
-            <p:txBody>
-              <a:bodyPr wrap="none" rtlCol="0">
-                <a:spAutoFit/>
-              </a:bodyPr>
-              <a:lstStyle/>
-              <a:p>
-                <a:r>
-                  <a:rPr lang="en-GB" sz="3600" dirty="0" smtClean="0">
-                    <a:solidFill>
-                      <a:srgbClr val="008000"/>
-                    </a:solidFill>
-                  </a:rPr>
-                  <a:t>enabled</a:t>
-                </a:r>
-              </a:p>
-            </p:txBody>
-          </p:sp>
-          <p:sp>
-            <p:nvSpPr>
-              <p:cNvPr id="473" name="TextBox 472"/>
-              <p:cNvSpPr txBox="1"/>
-              <p:nvPr/>
-            </p:nvSpPr>
-            <p:spPr>
-              <a:xfrm>
-                <a:off x="7381827" y="4971133"/>
-                <a:ext cx="266585" cy="323166"/>
-              </a:xfrm>
-              <a:prstGeom prst="rect">
-                <a:avLst/>
-              </a:prstGeom>
-              <a:noFill/>
-            </p:spPr>
-            <p:txBody>
-              <a:bodyPr wrap="none" rtlCol="0">
-                <a:spAutoFit/>
-              </a:bodyPr>
-              <a:lstStyle/>
-              <a:p>
-                <a:r>
-                  <a:rPr lang="en-GB" sz="3600" dirty="0" smtClean="0">
-                    <a:solidFill>
-                      <a:srgbClr val="FF0000"/>
-                    </a:solidFill>
-                  </a:rPr>
-                  <a:t>in</a:t>
-                </a:r>
-              </a:p>
-            </p:txBody>
-          </p:sp>
-          <p:sp>
-            <p:nvSpPr>
-              <p:cNvPr id="474" name="TextBox 473"/>
-              <p:cNvSpPr txBox="1"/>
-              <p:nvPr/>
-            </p:nvSpPr>
-            <p:spPr>
-              <a:xfrm>
-                <a:off x="3137679" y="5666379"/>
-                <a:ext cx="911180" cy="323166"/>
-              </a:xfrm>
-              <a:prstGeom prst="rect">
-                <a:avLst/>
-              </a:prstGeom>
-              <a:noFill/>
-            </p:spPr>
-            <p:txBody>
-              <a:bodyPr wrap="none" rtlCol="0">
-                <a:spAutoFit/>
-              </a:bodyPr>
-              <a:lstStyle/>
-              <a:p>
-                <a:r>
-                  <a:rPr lang="en-GB" sz="3600" dirty="0" smtClean="0">
-                    <a:solidFill>
-                      <a:srgbClr val="FF0000"/>
-                    </a:solidFill>
-                  </a:rPr>
-                  <a:t>v-lookup</a:t>
-                </a:r>
-              </a:p>
-            </p:txBody>
-          </p:sp>
-          <p:sp>
-            <p:nvSpPr>
-              <p:cNvPr id="475" name="TextBox 474"/>
-              <p:cNvSpPr txBox="1"/>
-              <p:nvPr/>
-            </p:nvSpPr>
-            <p:spPr>
-              <a:xfrm>
-                <a:off x="262657" y="1238859"/>
-                <a:ext cx="4910590" cy="323166"/>
-              </a:xfrm>
-              <a:prstGeom prst="rect">
-                <a:avLst/>
-              </a:prstGeom>
-              <a:noFill/>
-              <a:ln>
-                <a:noFill/>
-              </a:ln>
-            </p:spPr>
-            <p:txBody>
-              <a:bodyPr wrap="square" rtlCol="0">
-                <a:spAutoFit/>
-              </a:bodyPr>
-              <a:lstStyle/>
-              <a:p>
-                <a:pPr algn="ctr"/>
-                <a:r>
-                  <a:rPr lang="en-GB" sz="3600" i="1" dirty="0"/>
-                  <a:t>O</a:t>
-                </a:r>
-                <a:r>
-                  <a:rPr lang="en-GB" sz="3600" i="1" dirty="0" smtClean="0"/>
-                  <a:t>riginal Input Tree</a:t>
-                </a:r>
-              </a:p>
-            </p:txBody>
-          </p:sp>
-          <p:sp>
-            <p:nvSpPr>
-              <p:cNvPr id="476" name="TextBox 475"/>
-              <p:cNvSpPr txBox="1"/>
-              <p:nvPr/>
-            </p:nvSpPr>
-            <p:spPr>
-              <a:xfrm>
-                <a:off x="5173247" y="1238859"/>
-                <a:ext cx="3716754" cy="323166"/>
-              </a:xfrm>
-              <a:prstGeom prst="rect">
-                <a:avLst/>
-              </a:prstGeom>
-              <a:noFill/>
-              <a:ln>
-                <a:noFill/>
-              </a:ln>
-            </p:spPr>
-            <p:txBody>
-              <a:bodyPr wrap="square" rtlCol="0">
-                <a:spAutoFit/>
-              </a:bodyPr>
-              <a:lstStyle/>
-              <a:p>
-                <a:pPr algn="ctr"/>
-                <a:r>
-                  <a:rPr lang="en-GB" sz="3600" i="1" dirty="0">
-                    <a:solidFill>
-                      <a:srgbClr val="660066"/>
-                    </a:solidFill>
-                  </a:rPr>
-                  <a:t>D</a:t>
-                </a:r>
-                <a:r>
-                  <a:rPr lang="en-GB" sz="3600" i="1" dirty="0" smtClean="0">
-                    <a:solidFill>
-                      <a:srgbClr val="660066"/>
-                    </a:solidFill>
-                  </a:rPr>
-                  <a:t>erived Petri Net</a:t>
-                </a:r>
-              </a:p>
-            </p:txBody>
-          </p:sp>
-          <p:cxnSp>
-            <p:nvCxnSpPr>
-              <p:cNvPr id="477" name="Straight Connector 476"/>
-              <p:cNvCxnSpPr/>
-              <p:nvPr/>
-            </p:nvCxnSpPr>
-            <p:spPr>
-              <a:xfrm>
-                <a:off x="4776049" y="3244950"/>
-                <a:ext cx="227751" cy="323750"/>
-              </a:xfrm>
-              <a:prstGeom prst="line">
-                <a:avLst/>
-              </a:prstGeom>
-              <a:ln>
-                <a:solidFill>
-                  <a:srgbClr val="3366FF"/>
-                </a:solidFill>
-              </a:ln>
-              <a:effectLst/>
-            </p:spPr>
-            <p:style>
-              <a:lnRef idx="2">
-                <a:schemeClr val="accent1"/>
-              </a:lnRef>
-              <a:fillRef idx="0">
-                <a:schemeClr val="accent1"/>
-              </a:fillRef>
-              <a:effectRef idx="1">
-                <a:schemeClr val="accent1"/>
-              </a:effectRef>
-              <a:fontRef idx="minor">
-                <a:schemeClr val="tx1"/>
-              </a:fontRef>
-            </p:style>
-          </p:cxnSp>
-          <p:cxnSp>
-            <p:nvCxnSpPr>
-              <p:cNvPr id="478" name="Straight Connector 477"/>
-              <p:cNvCxnSpPr/>
-              <p:nvPr/>
-            </p:nvCxnSpPr>
-            <p:spPr>
-              <a:xfrm flipH="1">
-                <a:off x="7080250" y="3847241"/>
-                <a:ext cx="474028" cy="0"/>
-              </a:xfrm>
-              <a:prstGeom prst="line">
-                <a:avLst/>
-              </a:prstGeom>
-              <a:ln>
-                <a:solidFill>
-                  <a:srgbClr val="3366FF"/>
-                </a:solidFill>
-                <a:headEnd type="triangle" w="lg" len="lg"/>
-                <a:tailEnd type="none"/>
-              </a:ln>
-              <a:effectLst/>
-            </p:spPr>
-            <p:style>
-              <a:lnRef idx="2">
-                <a:schemeClr val="accent1"/>
-              </a:lnRef>
-              <a:fillRef idx="0">
-                <a:schemeClr val="accent1"/>
-              </a:fillRef>
-              <a:effectRef idx="1">
-                <a:schemeClr val="accent1"/>
-              </a:effectRef>
-              <a:fontRef idx="minor">
-                <a:schemeClr val="tx1"/>
-              </a:fontRef>
-            </p:style>
-          </p:cxnSp>
-          <p:cxnSp>
-            <p:nvCxnSpPr>
-              <p:cNvPr id="479" name="Straight Connector 478"/>
-              <p:cNvCxnSpPr/>
-              <p:nvPr/>
-            </p:nvCxnSpPr>
-            <p:spPr>
-              <a:xfrm flipH="1">
-                <a:off x="7080250" y="4478745"/>
-                <a:ext cx="474028" cy="698536"/>
-              </a:xfrm>
-              <a:prstGeom prst="line">
-                <a:avLst/>
-              </a:prstGeom>
-              <a:ln>
-                <a:solidFill>
-                  <a:srgbClr val="3366FF"/>
-                </a:solidFill>
-                <a:headEnd type="triangle" w="lg" len="lg"/>
-                <a:tailEnd type="none"/>
-              </a:ln>
-              <a:effectLst/>
-            </p:spPr>
-            <p:style>
-              <a:lnRef idx="2">
-                <a:schemeClr val="accent1"/>
-              </a:lnRef>
-              <a:fillRef idx="0">
-                <a:schemeClr val="accent1"/>
-              </a:fillRef>
-              <a:effectRef idx="1">
-                <a:schemeClr val="accent1"/>
-              </a:effectRef>
-              <a:fontRef idx="minor">
-                <a:schemeClr val="tx1"/>
-              </a:fontRef>
-            </p:style>
-          </p:cxnSp>
-          <p:cxnSp>
-            <p:nvCxnSpPr>
-              <p:cNvPr id="480" name="Straight Connector 479"/>
-              <p:cNvCxnSpPr/>
-              <p:nvPr/>
-            </p:nvCxnSpPr>
-            <p:spPr>
-              <a:xfrm>
-                <a:off x="4671317" y="5177281"/>
-                <a:ext cx="2408933" cy="0"/>
-              </a:xfrm>
-              <a:prstGeom prst="line">
-                <a:avLst/>
-              </a:prstGeom>
-              <a:ln>
-                <a:solidFill>
-                  <a:srgbClr val="3366FF"/>
-                </a:solidFill>
-              </a:ln>
-              <a:effectLst/>
-            </p:spPr>
-            <p:style>
-              <a:lnRef idx="2">
-                <a:schemeClr val="accent1"/>
-              </a:lnRef>
-              <a:fillRef idx="0">
-                <a:schemeClr val="accent1"/>
-              </a:fillRef>
-              <a:effectRef idx="1">
-                <a:schemeClr val="accent1"/>
-              </a:effectRef>
-              <a:fontRef idx="minor">
-                <a:schemeClr val="tx1"/>
-              </a:fontRef>
-            </p:style>
-          </p:cxnSp>
-          <p:cxnSp>
-            <p:nvCxnSpPr>
-              <p:cNvPr id="481" name="Straight Connector 480"/>
-              <p:cNvCxnSpPr>
-                <a:endCxn id="416" idx="2"/>
-              </p:cNvCxnSpPr>
-              <p:nvPr/>
-            </p:nvCxnSpPr>
-            <p:spPr>
-              <a:xfrm flipH="1" flipV="1">
-                <a:off x="4266937" y="5086623"/>
-                <a:ext cx="404380" cy="90659"/>
-              </a:xfrm>
-              <a:prstGeom prst="line">
-                <a:avLst/>
-              </a:prstGeom>
-              <a:ln>
-                <a:solidFill>
-                  <a:srgbClr val="3366FF"/>
-                </a:solidFill>
-              </a:ln>
-              <a:effectLst/>
-            </p:spPr>
-            <p:style>
-              <a:lnRef idx="2">
-                <a:schemeClr val="accent1"/>
-              </a:lnRef>
-              <a:fillRef idx="0">
-                <a:schemeClr val="accent1"/>
-              </a:fillRef>
-              <a:effectRef idx="1">
-                <a:schemeClr val="accent1"/>
-              </a:effectRef>
-              <a:fontRef idx="minor">
-                <a:schemeClr val="tx1"/>
-              </a:fontRef>
-            </p:style>
-          </p:cxnSp>
-          <p:sp>
-            <p:nvSpPr>
-              <p:cNvPr id="482" name="TextBox 481"/>
-              <p:cNvSpPr txBox="1"/>
-              <p:nvPr/>
-            </p:nvSpPr>
-            <p:spPr>
-              <a:xfrm>
-                <a:off x="4730540" y="3471397"/>
-                <a:ext cx="1139307" cy="323166"/>
-              </a:xfrm>
-              <a:prstGeom prst="rect">
-                <a:avLst/>
-              </a:prstGeom>
-              <a:noFill/>
-            </p:spPr>
-            <p:txBody>
-              <a:bodyPr wrap="none" rtlCol="0">
-                <a:spAutoFit/>
-              </a:bodyPr>
-              <a:lstStyle/>
-              <a:p>
-                <a:r>
-                  <a:rPr lang="en-GB" sz="3600" dirty="0" smtClean="0">
-                    <a:solidFill>
-                      <a:srgbClr val="3366FF"/>
-                    </a:solidFill>
-                  </a:rPr>
-                  <a:t> transitions</a:t>
-                </a:r>
-              </a:p>
-            </p:txBody>
-          </p:sp>
-          <p:cxnSp>
-            <p:nvCxnSpPr>
-              <p:cNvPr id="483" name="Straight Connector 482"/>
-              <p:cNvCxnSpPr/>
-              <p:nvPr/>
-            </p:nvCxnSpPr>
-            <p:spPr>
-              <a:xfrm flipH="1">
-                <a:off x="7080250" y="3244950"/>
-                <a:ext cx="474026" cy="0"/>
-              </a:xfrm>
-              <a:prstGeom prst="line">
-                <a:avLst/>
-              </a:prstGeom>
-              <a:ln>
-                <a:solidFill>
-                  <a:srgbClr val="3366FF"/>
-                </a:solidFill>
-                <a:headEnd type="triangle" w="lg" len="lg"/>
-                <a:tailEnd type="none"/>
-              </a:ln>
-              <a:effectLst/>
-            </p:spPr>
-            <p:style>
-              <a:lnRef idx="2">
-                <a:schemeClr val="accent1"/>
-              </a:lnRef>
-              <a:fillRef idx="0">
-                <a:schemeClr val="accent1"/>
-              </a:fillRef>
-              <a:effectRef idx="1">
-                <a:schemeClr val="accent1"/>
-              </a:effectRef>
-              <a:fontRef idx="minor">
-                <a:schemeClr val="tx1"/>
-              </a:fontRef>
-            </p:style>
-          </p:cxnSp>
-          <p:sp>
-            <p:nvSpPr>
-              <p:cNvPr id="484" name="TextBox 483"/>
-              <p:cNvSpPr txBox="1"/>
-              <p:nvPr/>
-            </p:nvSpPr>
-            <p:spPr>
-              <a:xfrm>
-                <a:off x="4730524" y="5080887"/>
-                <a:ext cx="1139307" cy="323166"/>
-              </a:xfrm>
-              <a:prstGeom prst="rect">
-                <a:avLst/>
-              </a:prstGeom>
-              <a:noFill/>
-            </p:spPr>
-            <p:txBody>
-              <a:bodyPr wrap="none" rtlCol="0">
-                <a:spAutoFit/>
-              </a:bodyPr>
-              <a:lstStyle/>
-              <a:p>
-                <a:r>
-                  <a:rPr lang="en-GB" sz="3600" dirty="0" smtClean="0">
-                    <a:solidFill>
-                      <a:srgbClr val="3366FF"/>
-                    </a:solidFill>
-                  </a:rPr>
-                  <a:t> transitions</a:t>
-                </a:r>
-              </a:p>
-            </p:txBody>
-          </p:sp>
-          <p:sp>
-            <p:nvSpPr>
-              <p:cNvPr id="485" name="TextBox 484"/>
-              <p:cNvSpPr txBox="1"/>
-              <p:nvPr/>
-            </p:nvSpPr>
-            <p:spPr>
-              <a:xfrm>
-                <a:off x="4730540" y="3963363"/>
-                <a:ext cx="641800" cy="323166"/>
-              </a:xfrm>
-              <a:prstGeom prst="rect">
-                <a:avLst/>
-              </a:prstGeom>
-              <a:noFill/>
-            </p:spPr>
-            <p:txBody>
-              <a:bodyPr wrap="none" rtlCol="0">
-                <a:spAutoFit/>
-              </a:bodyPr>
-              <a:lstStyle/>
-              <a:p>
-                <a:r>
-                  <a:rPr lang="en-GB" sz="3600" dirty="0" smtClean="0">
-                    <a:solidFill>
-                      <a:srgbClr val="3366FF"/>
-                    </a:solidFill>
-                  </a:rPr>
-                  <a:t> place</a:t>
-                </a:r>
-              </a:p>
-            </p:txBody>
-          </p:sp>
-          <p:sp>
-            <p:nvSpPr>
-              <p:cNvPr id="486" name="TextBox 485"/>
-              <p:cNvSpPr txBox="1"/>
-              <p:nvPr/>
-            </p:nvSpPr>
-            <p:spPr>
-              <a:xfrm>
-                <a:off x="4730540" y="4604986"/>
-                <a:ext cx="641800" cy="323166"/>
-              </a:xfrm>
-              <a:prstGeom prst="rect">
-                <a:avLst/>
-              </a:prstGeom>
-              <a:noFill/>
-            </p:spPr>
-            <p:txBody>
-              <a:bodyPr wrap="none" rtlCol="0">
-                <a:spAutoFit/>
-              </a:bodyPr>
-              <a:lstStyle/>
-              <a:p>
-                <a:r>
-                  <a:rPr lang="en-GB" sz="3600" dirty="0" smtClean="0">
-                    <a:solidFill>
-                      <a:srgbClr val="3366FF"/>
-                    </a:solidFill>
-                  </a:rPr>
-                  <a:t> place</a:t>
-                </a:r>
-              </a:p>
-            </p:txBody>
-          </p:sp>
-          <p:cxnSp>
-            <p:nvCxnSpPr>
-              <p:cNvPr id="487" name="Straight Connector 486"/>
-              <p:cNvCxnSpPr/>
-              <p:nvPr/>
-            </p:nvCxnSpPr>
-            <p:spPr>
-              <a:xfrm flipH="1" flipV="1">
-                <a:off x="3533333" y="2679700"/>
-                <a:ext cx="224491" cy="153341"/>
-              </a:xfrm>
-              <a:prstGeom prst="line">
-                <a:avLst/>
-              </a:prstGeom>
-              <a:ln>
-                <a:solidFill>
-                  <a:srgbClr val="FF0000"/>
-                </a:solidFill>
-              </a:ln>
-              <a:effectLst/>
-            </p:spPr>
-            <p:style>
-              <a:lnRef idx="2">
-                <a:schemeClr val="accent1"/>
-              </a:lnRef>
-              <a:fillRef idx="0">
-                <a:schemeClr val="accent1"/>
-              </a:fillRef>
-              <a:effectRef idx="1">
-                <a:schemeClr val="accent1"/>
-              </a:effectRef>
-              <a:fontRef idx="minor">
-                <a:schemeClr val="tx1"/>
-              </a:fontRef>
-            </p:style>
-          </p:cxnSp>
-          <p:sp>
-            <p:nvSpPr>
-              <p:cNvPr id="488" name="TextBox 487"/>
-              <p:cNvSpPr txBox="1"/>
-              <p:nvPr/>
-            </p:nvSpPr>
-            <p:spPr>
-              <a:xfrm>
-                <a:off x="3394797" y="2353060"/>
-                <a:ext cx="953221" cy="323166"/>
-              </a:xfrm>
-              <a:prstGeom prst="rect">
-                <a:avLst/>
-              </a:prstGeom>
-              <a:noFill/>
-            </p:spPr>
-            <p:txBody>
-              <a:bodyPr wrap="none" rtlCol="0">
-                <a:spAutoFit/>
-              </a:bodyPr>
-              <a:lstStyle/>
-              <a:p>
-                <a:r>
-                  <a:rPr lang="en-GB" sz="3600" dirty="0" smtClean="0">
-                    <a:solidFill>
-                      <a:srgbClr val="FF0000"/>
-                    </a:solidFill>
-                  </a:rPr>
-                  <a:t>incoming</a:t>
-                </a:r>
-              </a:p>
-            </p:txBody>
-          </p:sp>
-          <p:cxnSp>
-            <p:nvCxnSpPr>
-              <p:cNvPr id="489" name="Straight Connector 488"/>
-              <p:cNvCxnSpPr/>
-              <p:nvPr/>
-            </p:nvCxnSpPr>
-            <p:spPr>
-              <a:xfrm flipV="1">
-                <a:off x="7080250" y="3244950"/>
-                <a:ext cx="0" cy="602291"/>
-              </a:xfrm>
-              <a:prstGeom prst="line">
-                <a:avLst/>
-              </a:prstGeom>
-              <a:ln>
-                <a:solidFill>
-                  <a:srgbClr val="3366FF"/>
-                </a:solidFill>
-              </a:ln>
-              <a:effectLst/>
-            </p:spPr>
-            <p:style>
-              <a:lnRef idx="2">
-                <a:schemeClr val="accent1"/>
-              </a:lnRef>
-              <a:fillRef idx="0">
-                <a:schemeClr val="accent1"/>
-              </a:fillRef>
-              <a:effectRef idx="1">
-                <a:schemeClr val="accent1"/>
-              </a:effectRef>
-              <a:fontRef idx="minor">
-                <a:schemeClr val="tx1"/>
-              </a:fontRef>
-            </p:style>
-          </p:cxnSp>
-          <p:cxnSp>
-            <p:nvCxnSpPr>
-              <p:cNvPr id="490" name="Straight Connector 489"/>
-              <p:cNvCxnSpPr/>
-              <p:nvPr/>
-            </p:nvCxnSpPr>
-            <p:spPr>
-              <a:xfrm>
-                <a:off x="5003800" y="3568700"/>
-                <a:ext cx="2076450" cy="0"/>
-              </a:xfrm>
-              <a:prstGeom prst="line">
-                <a:avLst/>
-              </a:prstGeom>
-              <a:ln>
-                <a:solidFill>
-                  <a:srgbClr val="3366FF"/>
-                </a:solidFill>
-              </a:ln>
-              <a:effectLst/>
-            </p:spPr>
-            <p:style>
-              <a:lnRef idx="2">
-                <a:schemeClr val="accent1"/>
-              </a:lnRef>
-              <a:fillRef idx="0">
-                <a:schemeClr val="accent1"/>
-              </a:fillRef>
-              <a:effectRef idx="1">
-                <a:schemeClr val="accent1"/>
-              </a:effectRef>
-              <a:fontRef idx="minor">
-                <a:schemeClr val="tx1"/>
-              </a:fontRef>
-            </p:style>
-          </p:cxnSp>
-          <p:sp>
-            <p:nvSpPr>
-              <p:cNvPr id="491" name="TextBox 490"/>
-              <p:cNvSpPr txBox="1"/>
-              <p:nvPr/>
-            </p:nvSpPr>
-            <p:spPr>
-              <a:xfrm>
-                <a:off x="7319106" y="4602644"/>
-                <a:ext cx="412658" cy="323166"/>
-              </a:xfrm>
-              <a:prstGeom prst="rect">
-                <a:avLst/>
-              </a:prstGeom>
-              <a:noFill/>
-            </p:spPr>
-            <p:txBody>
-              <a:bodyPr wrap="none" rtlCol="0">
-                <a:spAutoFit/>
-              </a:bodyPr>
-              <a:lstStyle/>
-              <a:p>
-                <a:r>
-                  <a:rPr lang="en-GB" sz="3600" dirty="0" smtClean="0">
-                    <a:solidFill>
-                      <a:srgbClr val="FF0000"/>
-                    </a:solidFill>
-                  </a:rPr>
-                  <a:t>out</a:t>
-                </a:r>
-              </a:p>
-            </p:txBody>
-          </p:sp>
-        </p:grpSp>
-      </p:grpSp>
       <p:pic>
         <p:nvPicPr>
           <p:cNvPr id="494" name="Picture 493" descr="poster-figure-1.pdf"/>
@@ -13618,6 +9662,36 @@
           <a:xfrm>
             <a:off x="24376889" y="24802062"/>
             <a:ext cx="4446778" cy="4741164"/>
+          </a:xfrm>
+          <a:prstGeom prst="rect">
+            <a:avLst/>
+          </a:prstGeom>
+        </p:spPr>
+      </p:pic>
+      <p:pic>
+        <p:nvPicPr>
+          <p:cNvPr id="5" name="Picture 4" descr="example-asg.pdf"/>
+          <p:cNvPicPr>
+            <a:picLocks noChangeAspect="1"/>
+          </p:cNvPicPr>
+          <p:nvPr/>
+        </p:nvPicPr>
+        <p:blipFill>
+          <a:blip r:embed="rId9">
+            <a:extLst>
+              <a:ext uri="{28A0092B-C50C-407E-A947-70E740481C1C}">
+                <a14:useLocalDpi xmlns:a14="http://schemas.microsoft.com/office/drawing/2010/main" val="0"/>
+              </a:ext>
+            </a:extLst>
+          </a:blip>
+          <a:stretch>
+            <a:fillRect/>
+          </a:stretch>
+        </p:blipFill>
+        <p:spPr>
+          <a:xfrm>
+            <a:off x="1503836" y="18829502"/>
+            <a:ext cx="17136951" cy="10545816"/>
           </a:xfrm>
           <a:prstGeom prst="rect">
             <a:avLst/>

</xml_diff>

<commit_message>
Examples (ttc-2015-fuml-activity-diagrams documentation): Updated measurement results.
</commit_message>
<xml_diff>
--- a/examples/ttc-2015-fuml-activity-diagrams/documentation/figures/solution-poster-a0.pptx
+++ b/examples/ttc-2015-fuml-activity-diagrams/documentation/figures/solution-poster-a0.pptx
@@ -192,7 +192,7 @@
           <a:p>
             <a:fld id="{8249DFA1-11E0-AC4F-B82E-E4156D0C46C6}" type="datetimeFigureOut">
               <a:rPr lang="en-US" smtClean="0"/>
-              <a:t>05/03/16</a:t>
+              <a:t>12/05/16</a:t>
             </a:fld>
             <a:endParaRPr lang="en-GB"/>
           </a:p>
@@ -730,7 +730,7 @@
           <a:p>
             <a:fld id="{84979CAE-5A64-144B-B638-52047A26C15E}" type="datetimeFigureOut">
               <a:rPr lang="en-US" smtClean="0"/>
-              <a:t>05/03/16</a:t>
+              <a:t>12/05/16</a:t>
             </a:fld>
             <a:endParaRPr lang="en-GB"/>
           </a:p>
@@ -900,7 +900,7 @@
           <a:p>
             <a:fld id="{84979CAE-5A64-144B-B638-52047A26C15E}" type="datetimeFigureOut">
               <a:rPr lang="en-US" smtClean="0"/>
-              <a:t>05/03/16</a:t>
+              <a:t>12/05/16</a:t>
             </a:fld>
             <a:endParaRPr lang="en-GB"/>
           </a:p>
@@ -1080,7 +1080,7 @@
           <a:p>
             <a:fld id="{84979CAE-5A64-144B-B638-52047A26C15E}" type="datetimeFigureOut">
               <a:rPr lang="en-US" smtClean="0"/>
-              <a:t>05/03/16</a:t>
+              <a:t>12/05/16</a:t>
             </a:fld>
             <a:endParaRPr lang="en-GB"/>
           </a:p>
@@ -1250,7 +1250,7 @@
           <a:p>
             <a:fld id="{84979CAE-5A64-144B-B638-52047A26C15E}" type="datetimeFigureOut">
               <a:rPr lang="en-US" smtClean="0"/>
-              <a:t>05/03/16</a:t>
+              <a:t>12/05/16</a:t>
             </a:fld>
             <a:endParaRPr lang="en-GB"/>
           </a:p>
@@ -1496,7 +1496,7 @@
           <a:p>
             <a:fld id="{84979CAE-5A64-144B-B638-52047A26C15E}" type="datetimeFigureOut">
               <a:rPr lang="en-US" smtClean="0"/>
-              <a:t>05/03/16</a:t>
+              <a:t>12/05/16</a:t>
             </a:fld>
             <a:endParaRPr lang="en-GB"/>
           </a:p>
@@ -1784,7 +1784,7 @@
           <a:p>
             <a:fld id="{84979CAE-5A64-144B-B638-52047A26C15E}" type="datetimeFigureOut">
               <a:rPr lang="en-US" smtClean="0"/>
-              <a:t>05/03/16</a:t>
+              <a:t>12/05/16</a:t>
             </a:fld>
             <a:endParaRPr lang="en-GB"/>
           </a:p>
@@ -2211,7 +2211,7 @@
           <a:p>
             <a:fld id="{84979CAE-5A64-144B-B638-52047A26C15E}" type="datetimeFigureOut">
               <a:rPr lang="en-US" smtClean="0"/>
-              <a:t>05/03/16</a:t>
+              <a:t>12/05/16</a:t>
             </a:fld>
             <a:endParaRPr lang="en-GB"/>
           </a:p>
@@ -2329,7 +2329,7 @@
           <a:p>
             <a:fld id="{84979CAE-5A64-144B-B638-52047A26C15E}" type="datetimeFigureOut">
               <a:rPr lang="en-US" smtClean="0"/>
-              <a:t>05/03/16</a:t>
+              <a:t>12/05/16</a:t>
             </a:fld>
             <a:endParaRPr lang="en-GB"/>
           </a:p>
@@ -2424,7 +2424,7 @@
           <a:p>
             <a:fld id="{84979CAE-5A64-144B-B638-52047A26C15E}" type="datetimeFigureOut">
               <a:rPr lang="en-US" smtClean="0"/>
-              <a:t>05/03/16</a:t>
+              <a:t>12/05/16</a:t>
             </a:fld>
             <a:endParaRPr lang="en-GB"/>
           </a:p>
@@ -2701,7 +2701,7 @@
           <a:p>
             <a:fld id="{84979CAE-5A64-144B-B638-52047A26C15E}" type="datetimeFigureOut">
               <a:rPr lang="en-US" smtClean="0"/>
-              <a:t>05/03/16</a:t>
+              <a:t>12/05/16</a:t>
             </a:fld>
             <a:endParaRPr lang="en-GB"/>
           </a:p>
@@ -2954,7 +2954,7 @@
           <a:p>
             <a:fld id="{84979CAE-5A64-144B-B638-52047A26C15E}" type="datetimeFigureOut">
               <a:rPr lang="en-US" smtClean="0"/>
-              <a:t>05/03/16</a:t>
+              <a:t>12/05/16</a:t>
             </a:fld>
             <a:endParaRPr lang="en-GB"/>
           </a:p>
@@ -3167,7 +3167,7 @@
           <a:p>
             <a:fld id="{84979CAE-5A64-144B-B638-52047A26C15E}" type="datetimeFigureOut">
               <a:rPr lang="en-US" smtClean="0"/>
-              <a:t>05/03/16</a:t>
+              <a:t>12/05/16</a:t>
             </a:fld>
             <a:endParaRPr lang="en-GB"/>
           </a:p>
@@ -3615,15 +3615,7 @@
                   <a:schemeClr val="bg1"/>
                 </a:solidFill>
               </a:rPr>
-              <a:t>  RAG-controlled </a:t>
-            </a:r>
-            <a:r>
-              <a:rPr lang="en-GB" sz="16000" dirty="0" smtClean="0">
-                <a:solidFill>
-                  <a:schemeClr val="bg1"/>
-                </a:solidFill>
-              </a:rPr>
-              <a:t>rewriting</a:t>
+              <a:t>  RAG-controlled rewriting</a:t>
             </a:r>
             <a:endParaRPr lang="en-GB" sz="16000" dirty="0">
               <a:solidFill>
@@ -3682,15 +3674,7 @@
                   <a:schemeClr val="bg1"/>
                 </a:solidFill>
               </a:rPr>
-              <a:t> </a:t>
-            </a:r>
-            <a:r>
-              <a:rPr lang="en-GB" sz="10000" smtClean="0">
-                <a:solidFill>
-                  <a:schemeClr val="bg1"/>
-                </a:solidFill>
-              </a:rPr>
-              <a:t>solution </a:t>
+              <a:t> solution </a:t>
             </a:r>
             <a:r>
               <a:rPr lang="en-GB" sz="10000" dirty="0" smtClean="0">
@@ -8987,15 +8971,7 @@
             </a:r>
             <a:r>
               <a:rPr lang="en-GB" sz="6000" dirty="0" smtClean="0"/>
-              <a:t> </a:t>
-            </a:r>
-            <a:r>
-              <a:rPr lang="en-GB" sz="6000" dirty="0" smtClean="0"/>
-              <a:t>solution</a:t>
-            </a:r>
-            <a:r>
-              <a:rPr lang="en-GB" sz="6000" dirty="0" smtClean="0"/>
-              <a:t>: diagram to Petri net interpreter, uses a reference attribute grammar to   </a:t>
+              <a:t> solution: diagram to Petri net interpreter, uses a reference attribute grammar to   </a:t>
             </a:r>
           </a:p>
           <a:p>
@@ -9640,7 +9616,7 @@
       </p:sp>
       <p:pic>
         <p:nvPicPr>
-          <p:cNvPr id="6" name="Picture 5" descr="poster-figure-5.pdf"/>
+          <p:cNvPr id="5" name="Picture 4" descr="example-asg.pdf"/>
           <p:cNvPicPr>
             <a:picLocks noChangeAspect="1"/>
           </p:cNvPicPr>
@@ -9660,8 +9636,8 @@
         </p:blipFill>
         <p:spPr>
           <a:xfrm>
-            <a:off x="24376889" y="24802062"/>
-            <a:ext cx="4446778" cy="4741164"/>
+            <a:off x="1503836" y="18829502"/>
+            <a:ext cx="17136951" cy="10545816"/>
           </a:xfrm>
           <a:prstGeom prst="rect">
             <a:avLst/>
@@ -9670,7 +9646,7 @@
       </p:pic>
       <p:pic>
         <p:nvPicPr>
-          <p:cNvPr id="5" name="Picture 4" descr="example-asg.pdf"/>
+          <p:cNvPr id="7" name="Picture 6" descr="Pages from solution-presentation.pdf"/>
           <p:cNvPicPr>
             <a:picLocks noChangeAspect="1"/>
           </p:cNvPicPr>
@@ -9690,8 +9666,8 @@
         </p:blipFill>
         <p:spPr>
           <a:xfrm>
-            <a:off x="1503836" y="18829502"/>
-            <a:ext cx="17136951" cy="10545816"/>
+            <a:off x="24371301" y="24929822"/>
+            <a:ext cx="4462272" cy="4725670"/>
           </a:xfrm>
           <a:prstGeom prst="rect">
             <a:avLst/>

</xml_diff>

<commit_message>
Examples (ttc-2015-fuml-activity-diagrams): Updated address on solution poster.
</commit_message>
<xml_diff>
--- a/examples/ttc-2015-fuml-activity-diagrams/documentation/figures/solution-poster-a0.pptx
+++ b/examples/ttc-2015-fuml-activity-diagrams/documentation/figures/solution-poster-a0.pptx
@@ -192,7 +192,7 @@
           <a:p>
             <a:fld id="{8249DFA1-11E0-AC4F-B82E-E4156D0C46C6}" type="datetimeFigureOut">
               <a:rPr lang="en-US" smtClean="0"/>
-              <a:t>12/05/16</a:t>
+              <a:t>22/01/17</a:t>
             </a:fld>
             <a:endParaRPr lang="en-GB"/>
           </a:p>
@@ -730,7 +730,7 @@
           <a:p>
             <a:fld id="{84979CAE-5A64-144B-B638-52047A26C15E}" type="datetimeFigureOut">
               <a:rPr lang="en-US" smtClean="0"/>
-              <a:t>12/05/16</a:t>
+              <a:t>22/01/17</a:t>
             </a:fld>
             <a:endParaRPr lang="en-GB"/>
           </a:p>
@@ -900,7 +900,7 @@
           <a:p>
             <a:fld id="{84979CAE-5A64-144B-B638-52047A26C15E}" type="datetimeFigureOut">
               <a:rPr lang="en-US" smtClean="0"/>
-              <a:t>12/05/16</a:t>
+              <a:t>22/01/17</a:t>
             </a:fld>
             <a:endParaRPr lang="en-GB"/>
           </a:p>
@@ -1080,7 +1080,7 @@
           <a:p>
             <a:fld id="{84979CAE-5A64-144B-B638-52047A26C15E}" type="datetimeFigureOut">
               <a:rPr lang="en-US" smtClean="0"/>
-              <a:t>12/05/16</a:t>
+              <a:t>22/01/17</a:t>
             </a:fld>
             <a:endParaRPr lang="en-GB"/>
           </a:p>
@@ -1250,7 +1250,7 @@
           <a:p>
             <a:fld id="{84979CAE-5A64-144B-B638-52047A26C15E}" type="datetimeFigureOut">
               <a:rPr lang="en-US" smtClean="0"/>
-              <a:t>12/05/16</a:t>
+              <a:t>22/01/17</a:t>
             </a:fld>
             <a:endParaRPr lang="en-GB"/>
           </a:p>
@@ -1496,7 +1496,7 @@
           <a:p>
             <a:fld id="{84979CAE-5A64-144B-B638-52047A26C15E}" type="datetimeFigureOut">
               <a:rPr lang="en-US" smtClean="0"/>
-              <a:t>12/05/16</a:t>
+              <a:t>22/01/17</a:t>
             </a:fld>
             <a:endParaRPr lang="en-GB"/>
           </a:p>
@@ -1784,7 +1784,7 @@
           <a:p>
             <a:fld id="{84979CAE-5A64-144B-B638-52047A26C15E}" type="datetimeFigureOut">
               <a:rPr lang="en-US" smtClean="0"/>
-              <a:t>12/05/16</a:t>
+              <a:t>22/01/17</a:t>
             </a:fld>
             <a:endParaRPr lang="en-GB"/>
           </a:p>
@@ -2211,7 +2211,7 @@
           <a:p>
             <a:fld id="{84979CAE-5A64-144B-B638-52047A26C15E}" type="datetimeFigureOut">
               <a:rPr lang="en-US" smtClean="0"/>
-              <a:t>12/05/16</a:t>
+              <a:t>22/01/17</a:t>
             </a:fld>
             <a:endParaRPr lang="en-GB"/>
           </a:p>
@@ -2329,7 +2329,7 @@
           <a:p>
             <a:fld id="{84979CAE-5A64-144B-B638-52047A26C15E}" type="datetimeFigureOut">
               <a:rPr lang="en-US" smtClean="0"/>
-              <a:t>12/05/16</a:t>
+              <a:t>22/01/17</a:t>
             </a:fld>
             <a:endParaRPr lang="en-GB"/>
           </a:p>
@@ -2424,7 +2424,7 @@
           <a:p>
             <a:fld id="{84979CAE-5A64-144B-B638-52047A26C15E}" type="datetimeFigureOut">
               <a:rPr lang="en-US" smtClean="0"/>
-              <a:t>12/05/16</a:t>
+              <a:t>22/01/17</a:t>
             </a:fld>
             <a:endParaRPr lang="en-GB"/>
           </a:p>
@@ -2701,7 +2701,7 @@
           <a:p>
             <a:fld id="{84979CAE-5A64-144B-B638-52047A26C15E}" type="datetimeFigureOut">
               <a:rPr lang="en-US" smtClean="0"/>
-              <a:t>12/05/16</a:t>
+              <a:t>22/01/17</a:t>
             </a:fld>
             <a:endParaRPr lang="en-GB"/>
           </a:p>
@@ -2954,7 +2954,7 @@
           <a:p>
             <a:fld id="{84979CAE-5A64-144B-B638-52047A26C15E}" type="datetimeFigureOut">
               <a:rPr lang="en-US" smtClean="0"/>
-              <a:t>12/05/16</a:t>
+              <a:t>22/01/17</a:t>
             </a:fld>
             <a:endParaRPr lang="en-GB"/>
           </a:p>
@@ -3167,7 +3167,7 @@
           <a:p>
             <a:fld id="{84979CAE-5A64-144B-B638-52047A26C15E}" type="datetimeFigureOut">
               <a:rPr lang="en-US" smtClean="0"/>
-              <a:t>12/05/16</a:t>
+              <a:t>22/01/17</a:t>
             </a:fld>
             <a:endParaRPr lang="en-GB"/>
           </a:p>
@@ -3661,7 +3661,7 @@
               <a:t>A </a:t>
             </a:r>
             <a:r>
-              <a:rPr lang="en-GB" sz="10000" i="1" smtClean="0">
+              <a:rPr lang="en-GB" sz="10000" i="1" dirty="0" smtClean="0">
                 <a:solidFill>
                   <a:schemeClr val="bg1"/>
                 </a:solidFill>
@@ -3669,20 +3669,12 @@
               <a:t>RACR</a:t>
             </a:r>
             <a:r>
-              <a:rPr lang="en-GB" sz="10000" smtClean="0">
-                <a:solidFill>
-                  <a:schemeClr val="bg1"/>
-                </a:solidFill>
-              </a:rPr>
-              <a:t> solution </a:t>
-            </a:r>
-            <a:r>
               <a:rPr lang="en-GB" sz="10000" dirty="0" smtClean="0">
                 <a:solidFill>
                   <a:schemeClr val="bg1"/>
                 </a:solidFill>
               </a:rPr>
-              <a:t>of the </a:t>
+              <a:t> solution of the </a:t>
             </a:r>
             <a:r>
               <a:rPr lang="en-GB" sz="10000" i="1" dirty="0" smtClean="0">
@@ -7356,8 +7348,8 @@
           </a:solidFill>
         </p:spPr>
         <p:txBody>
-          <a:bodyPr vert="horz" lIns="417634" tIns="208817" rIns="417634" bIns="208817" rtlCol="0">
-            <a:normAutofit fontScale="47500" lnSpcReduction="20000"/>
+          <a:bodyPr vert="horz" lIns="417634" tIns="208817" rIns="417634" bIns="208817" rtlCol="0" anchor="ctr" anchorCtr="0">
+            <a:normAutofit fontScale="62500" lnSpcReduction="20000"/>
           </a:bodyPr>
           <a:lstStyle>
             <a:lvl1pPr marL="0" indent="0" algn="ctr" defTabSz="2088170" rtl="0" eaLnBrk="1" latinLnBrk="0" hangingPunct="1">
@@ -7524,20 +7516,12 @@
               <a:t>Christoff Bürger (</a:t>
             </a:r>
             <a:r>
-              <a:rPr lang="en-GB" sz="10000" smtClean="0">
-                <a:solidFill>
-                  <a:schemeClr val="bg1"/>
-                </a:solidFill>
-              </a:rPr>
-              <a:t>christoff.burger</a:t>
-            </a:r>
-            <a:r>
               <a:rPr lang="en-GB" sz="10000" dirty="0" err="1" smtClean="0">
                 <a:solidFill>
                   <a:schemeClr val="bg1"/>
                 </a:solidFill>
               </a:rPr>
-              <a:t>@cs.lth.se</a:t>
+              <a:t>christoff.buerger@gmail.com</a:t>
             </a:r>
             <a:r>
               <a:rPr lang="en-GB" sz="10000" dirty="0" smtClean="0">
@@ -7545,7 +7529,15 @@
                   <a:schemeClr val="bg1"/>
                 </a:solidFill>
               </a:rPr>
-              <a:t>, https://</a:t>
+              <a:t>, </a:t>
+            </a:r>
+            <a:r>
+              <a:rPr lang="en-GB" sz="10000" dirty="0" smtClean="0">
+                <a:solidFill>
+                  <a:schemeClr val="bg1"/>
+                </a:solidFill>
+              </a:rPr>
+              <a:t>https://</a:t>
             </a:r>
             <a:r>
               <a:rPr lang="en-GB" sz="10000" dirty="0" err="1" smtClean="0">
@@ -7593,18 +7585,13 @@
                   <a:schemeClr val="bg1"/>
                 </a:solidFill>
               </a:rPr>
-              <a:t>) </a:t>
-            </a:r>
-          </a:p>
-          <a:p>
-            <a:r>
-              <a:rPr lang="en-GB" sz="10000" dirty="0" smtClean="0">
-                <a:solidFill>
-                  <a:schemeClr val="bg1"/>
-                </a:solidFill>
-              </a:rPr>
-              <a:t>Dept. of Computer Science, Faculty of Engineering, LTH, Lund University, Lund, Sweden</a:t>
-            </a:r>
+              <a:t>)</a:t>
+            </a:r>
+            <a:endParaRPr lang="en-GB" sz="10000" dirty="0" smtClean="0">
+              <a:solidFill>
+                <a:schemeClr val="bg1"/>
+              </a:solidFill>
+            </a:endParaRPr>
           </a:p>
         </p:txBody>
       </p:sp>
@@ -7975,6 +7962,15 @@
                 <a:t> </a:t>
               </a:r>
               <a:r>
+                <a:rPr lang="de-DE" sz="6000" kern="0" dirty="0" err="1">
+                  <a:solidFill>
+                    <a:srgbClr val="FFFFFF"/>
+                  </a:solidFill>
+                  <a:cs typeface="Arial"/>
+                </a:rPr>
+                <a:t>r</a:t>
+              </a:r>
+              <a:r>
                 <a:rPr kumimoji="0" lang="de-DE" sz="6000" b="0" i="0" u="none" strike="noStrike" kern="0" cap="none" spc="0" normalizeH="0" baseline="0" noProof="0" dirty="0" err="1" smtClean="0">
                   <a:ln>
                     <a:noFill/>
@@ -7987,7 +7983,7 @@
                   <a:uFillTx/>
                   <a:cs typeface="Arial"/>
                 </a:rPr>
-                <a:t>Rewriting</a:t>
+                <a:t>ewriting</a:t>
               </a:r>
               <a:endParaRPr kumimoji="0" lang="de-DE" sz="6000" b="0" i="0" u="none" strike="noStrike" kern="0" cap="none" spc="0" normalizeH="0" baseline="0" noProof="0" dirty="0" smtClean="0">
                 <a:ln>
@@ -8086,6 +8082,15 @@
                 <a:t> </a:t>
               </a:r>
               <a:r>
+                <a:rPr lang="de-DE" sz="6000" kern="0" dirty="0" err="1">
+                  <a:solidFill>
+                    <a:srgbClr val="FFFFFF"/>
+                  </a:solidFill>
+                  <a:cs typeface="Arial"/>
+                </a:rPr>
+                <a:t>a</a:t>
+              </a:r>
+              <a:r>
                 <a:rPr kumimoji="0" lang="de-DE" sz="6000" b="0" i="0" u="none" strike="noStrike" kern="0" cap="none" spc="0" normalizeH="0" baseline="0" noProof="0" dirty="0" err="1" smtClean="0">
                   <a:ln>
                     <a:noFill/>
@@ -8098,7 +8103,7 @@
                   <a:uFillTx/>
                   <a:cs typeface="Arial"/>
                 </a:rPr>
-                <a:t>Analyses</a:t>
+                <a:t>nalyses</a:t>
               </a:r>
               <a:endParaRPr kumimoji="0" lang="de-DE" sz="6000" b="0" i="0" u="none" strike="noStrike" kern="0" cap="none" spc="0" normalizeH="0" baseline="0" noProof="0" dirty="0">
                 <a:ln>
@@ -8228,7 +8233,16 @@
                   <a:uFillTx/>
                   <a:cs typeface="Arial"/>
                 </a:rPr>
-                <a:t>RAG </a:t>
+                <a:t>RAG-</a:t>
+              </a:r>
+              <a:r>
+                <a:rPr lang="de-DE" sz="6000" kern="0" dirty="0" smtClean="0">
+                  <a:solidFill>
+                    <a:srgbClr val="FFFFFF"/>
+                  </a:solidFill>
+                  <a:cs typeface="Arial"/>
+                </a:rPr>
+                <a:t>c</a:t>
               </a:r>
               <a:r>
                 <a:rPr kumimoji="0" lang="de-DE" sz="6000" b="0" i="0" u="none" strike="noStrike" kern="0" cap="none" spc="0" normalizeH="0" baseline="0" noProof="0" dirty="0" err="1" smtClean="0">
@@ -8243,7 +8257,7 @@
                   <a:uFillTx/>
                   <a:cs typeface="Arial"/>
                 </a:rPr>
-                <a:t>Controlled</a:t>
+                <a:t>ontrolled</a:t>
               </a:r>
               <a:r>
                 <a:rPr kumimoji="0" lang="de-DE" sz="6000" b="0" i="0" u="none" strike="noStrike" kern="0" cap="none" spc="0" normalizeH="0" baseline="0" noProof="0" dirty="0" smtClean="0">
@@ -8261,6 +8275,15 @@
                 <a:t> </a:t>
               </a:r>
               <a:r>
+                <a:rPr lang="de-DE" sz="6000" kern="0" dirty="0" err="1">
+                  <a:solidFill>
+                    <a:srgbClr val="FFFFFF"/>
+                  </a:solidFill>
+                  <a:cs typeface="Arial"/>
+                </a:rPr>
+                <a:t>r</a:t>
+              </a:r>
+              <a:r>
                 <a:rPr kumimoji="0" lang="de-DE" sz="6000" b="0" i="0" u="none" strike="noStrike" kern="0" cap="none" spc="0" normalizeH="0" baseline="0" noProof="0" dirty="0" err="1" smtClean="0">
                   <a:ln>
                     <a:noFill/>
@@ -8273,7 +8296,7 @@
                   <a:uFillTx/>
                   <a:cs typeface="Arial"/>
                 </a:rPr>
-                <a:t>Rewriting</a:t>
+                <a:t>ewriting</a:t>
               </a:r>
               <a:endParaRPr kumimoji="0" lang="de-DE" sz="6000" b="0" i="0" u="none" strike="noStrike" kern="0" cap="none" spc="0" normalizeH="0" baseline="0" noProof="0" dirty="0" smtClean="0">
                 <a:ln>

</xml_diff>